<commit_message>
- Add new graph structure
</commit_message>
<xml_diff>
--- a/그래프모델링.pptx
+++ b/그래프모델링.pptx
@@ -18,6 +18,11 @@
     <p:sldId id="266" r:id="rId12"/>
     <p:sldId id="267" r:id="rId13"/>
     <p:sldId id="268" r:id="rId14"/>
+    <p:sldId id="270" r:id="rId15"/>
+    <p:sldId id="271" r:id="rId16"/>
+    <p:sldId id="272" r:id="rId17"/>
+    <p:sldId id="273" r:id="rId18"/>
+    <p:sldId id="274" r:id="rId19"/>
   </p:sldIdLst>
   <p:sldSz cx="12192000" cy="6858000"/>
   <p:notesSz cx="6858000" cy="9144000"/>
@@ -271,7 +276,7 @@
           <a:p>
             <a:fld id="{6C510B8C-81DC-452A-8BA2-C42E018654E1}" type="datetimeFigureOut">
               <a:rPr lang="ko-KR" altLang="en-US" smtClean="0"/>
-              <a:t>2020-02-14</a:t>
+              <a:t>2020-02-18</a:t>
             </a:fld>
             <a:endParaRPr lang="ko-KR" altLang="en-US"/>
           </a:p>
@@ -469,7 +474,7 @@
           <a:p>
             <a:fld id="{6C510B8C-81DC-452A-8BA2-C42E018654E1}" type="datetimeFigureOut">
               <a:rPr lang="ko-KR" altLang="en-US" smtClean="0"/>
-              <a:t>2020-02-14</a:t>
+              <a:t>2020-02-18</a:t>
             </a:fld>
             <a:endParaRPr lang="ko-KR" altLang="en-US"/>
           </a:p>
@@ -677,7 +682,7 @@
           <a:p>
             <a:fld id="{6C510B8C-81DC-452A-8BA2-C42E018654E1}" type="datetimeFigureOut">
               <a:rPr lang="ko-KR" altLang="en-US" smtClean="0"/>
-              <a:t>2020-02-14</a:t>
+              <a:t>2020-02-18</a:t>
             </a:fld>
             <a:endParaRPr lang="ko-KR" altLang="en-US"/>
           </a:p>
@@ -875,7 +880,7 @@
           <a:p>
             <a:fld id="{6C510B8C-81DC-452A-8BA2-C42E018654E1}" type="datetimeFigureOut">
               <a:rPr lang="ko-KR" altLang="en-US" smtClean="0"/>
-              <a:t>2020-02-14</a:t>
+              <a:t>2020-02-18</a:t>
             </a:fld>
             <a:endParaRPr lang="ko-KR" altLang="en-US"/>
           </a:p>
@@ -1150,7 +1155,7 @@
           <a:p>
             <a:fld id="{6C510B8C-81DC-452A-8BA2-C42E018654E1}" type="datetimeFigureOut">
               <a:rPr lang="ko-KR" altLang="en-US" smtClean="0"/>
-              <a:t>2020-02-14</a:t>
+              <a:t>2020-02-18</a:t>
             </a:fld>
             <a:endParaRPr lang="ko-KR" altLang="en-US"/>
           </a:p>
@@ -1415,7 +1420,7 @@
           <a:p>
             <a:fld id="{6C510B8C-81DC-452A-8BA2-C42E018654E1}" type="datetimeFigureOut">
               <a:rPr lang="ko-KR" altLang="en-US" smtClean="0"/>
-              <a:t>2020-02-14</a:t>
+              <a:t>2020-02-18</a:t>
             </a:fld>
             <a:endParaRPr lang="ko-KR" altLang="en-US"/>
           </a:p>
@@ -1827,7 +1832,7 @@
           <a:p>
             <a:fld id="{6C510B8C-81DC-452A-8BA2-C42E018654E1}" type="datetimeFigureOut">
               <a:rPr lang="ko-KR" altLang="en-US" smtClean="0"/>
-              <a:t>2020-02-14</a:t>
+              <a:t>2020-02-18</a:t>
             </a:fld>
             <a:endParaRPr lang="ko-KR" altLang="en-US"/>
           </a:p>
@@ -1968,7 +1973,7 @@
           <a:p>
             <a:fld id="{6C510B8C-81DC-452A-8BA2-C42E018654E1}" type="datetimeFigureOut">
               <a:rPr lang="ko-KR" altLang="en-US" smtClean="0"/>
-              <a:t>2020-02-14</a:t>
+              <a:t>2020-02-18</a:t>
             </a:fld>
             <a:endParaRPr lang="ko-KR" altLang="en-US"/>
           </a:p>
@@ -2081,7 +2086,7 @@
           <a:p>
             <a:fld id="{6C510B8C-81DC-452A-8BA2-C42E018654E1}" type="datetimeFigureOut">
               <a:rPr lang="ko-KR" altLang="en-US" smtClean="0"/>
-              <a:t>2020-02-14</a:t>
+              <a:t>2020-02-18</a:t>
             </a:fld>
             <a:endParaRPr lang="ko-KR" altLang="en-US"/>
           </a:p>
@@ -2392,7 +2397,7 @@
           <a:p>
             <a:fld id="{6C510B8C-81DC-452A-8BA2-C42E018654E1}" type="datetimeFigureOut">
               <a:rPr lang="ko-KR" altLang="en-US" smtClean="0"/>
-              <a:t>2020-02-14</a:t>
+              <a:t>2020-02-18</a:t>
             </a:fld>
             <a:endParaRPr lang="ko-KR" altLang="en-US"/>
           </a:p>
@@ -2680,7 +2685,7 @@
           <a:p>
             <a:fld id="{6C510B8C-81DC-452A-8BA2-C42E018654E1}" type="datetimeFigureOut">
               <a:rPr lang="ko-KR" altLang="en-US" smtClean="0"/>
-              <a:t>2020-02-14</a:t>
+              <a:t>2020-02-18</a:t>
             </a:fld>
             <a:endParaRPr lang="ko-KR" altLang="en-US"/>
           </a:p>
@@ -2921,7 +2926,7 @@
           <a:p>
             <a:fld id="{6C510B8C-81DC-452A-8BA2-C42E018654E1}" type="datetimeFigureOut">
               <a:rPr lang="ko-KR" altLang="en-US" smtClean="0"/>
-              <a:t>2020-02-14</a:t>
+              <a:t>2020-02-18</a:t>
             </a:fld>
             <a:endParaRPr lang="ko-KR" altLang="en-US"/>
           </a:p>
@@ -13186,6 +13191,2927 @@
 </p:sld>
 </file>
 
+<file path=ppt/slides/slide14.xml><?xml version="1.0" encoding="utf-8"?>
+<p:sld xmlns:a="http://schemas.openxmlformats.org/drawingml/2006/main" xmlns:r="http://schemas.openxmlformats.org/officeDocument/2006/relationships" xmlns:p="http://schemas.openxmlformats.org/presentationml/2006/main">
+  <p:cSld>
+    <p:spTree>
+      <p:nvGrpSpPr>
+        <p:cNvPr id="1" name=""/>
+        <p:cNvGrpSpPr/>
+        <p:nvPr/>
+      </p:nvGrpSpPr>
+      <p:grpSpPr>
+        <a:xfrm>
+          <a:off x="0" y="0"/>
+          <a:ext cx="0" cy="0"/>
+          <a:chOff x="0" y="0"/>
+          <a:chExt cx="0" cy="0"/>
+        </a:xfrm>
+      </p:grpSpPr>
+      <p:sp>
+        <p:nvSpPr>
+          <p:cNvPr id="4" name="화살표: 오각형 3">
+            <a:extLst>
+              <a:ext uri="{FF2B5EF4-FFF2-40B4-BE49-F238E27FC236}">
+                <a16:creationId xmlns:a16="http://schemas.microsoft.com/office/drawing/2014/main" id="{B15A06DF-DFFD-4319-AE40-E07BE51C3A98}"/>
+              </a:ext>
+            </a:extLst>
+          </p:cNvPr>
+          <p:cNvSpPr/>
+          <p:nvPr/>
+        </p:nvSpPr>
+        <p:spPr>
+          <a:xfrm rot="16200000">
+            <a:off x="2650101" y="3646305"/>
+            <a:ext cx="806172" cy="1265067"/>
+          </a:xfrm>
+          <a:prstGeom prst="homePlate">
+            <a:avLst>
+              <a:gd name="adj" fmla="val 39700"/>
+            </a:avLst>
+          </a:prstGeom>
+          <a:solidFill>
+            <a:srgbClr val="E5E57F"/>
+          </a:solidFill>
+          <a:ln w="19050">
+            <a:solidFill>
+              <a:schemeClr val="tx1"/>
+            </a:solidFill>
+          </a:ln>
+        </p:spPr>
+        <p:style>
+          <a:lnRef idx="2">
+            <a:schemeClr val="accent1">
+              <a:shade val="50000"/>
+            </a:schemeClr>
+          </a:lnRef>
+          <a:fillRef idx="1">
+            <a:schemeClr val="accent1"/>
+          </a:fillRef>
+          <a:effectRef idx="0">
+            <a:schemeClr val="accent1"/>
+          </a:effectRef>
+          <a:fontRef idx="minor">
+            <a:schemeClr val="lt1"/>
+          </a:fontRef>
+        </p:style>
+        <p:txBody>
+          <a:bodyPr vert="eaVert" rtlCol="0" anchor="ctr"/>
+          <a:lstStyle/>
+          <a:p>
+            <a:pPr algn="ctr"/>
+            <a:r>
+              <a:rPr lang="en-US" altLang="ko-KR" sz="2000">
+                <a:solidFill>
+                  <a:schemeClr val="tx1"/>
+                </a:solidFill>
+                <a:latin typeface="Arial" panose="020B0604020202020204" pitchFamily="34" charset="0"/>
+                <a:cs typeface="Arial" panose="020B0604020202020204" pitchFamily="34" charset="0"/>
+              </a:rPr>
+              <a:t>Person</a:t>
+            </a:r>
+            <a:endParaRPr lang="ko-KR" altLang="en-US" sz="2000">
+              <a:solidFill>
+                <a:schemeClr val="tx1"/>
+              </a:solidFill>
+              <a:latin typeface="Arial" panose="020B0604020202020204" pitchFamily="34" charset="0"/>
+              <a:cs typeface="Arial" panose="020B0604020202020204" pitchFamily="34" charset="0"/>
+            </a:endParaRPr>
+          </a:p>
+        </p:txBody>
+      </p:sp>
+      <p:sp>
+        <p:nvSpPr>
+          <p:cNvPr id="5" name="사각형: 둥근 모서리 4">
+            <a:extLst>
+              <a:ext uri="{FF2B5EF4-FFF2-40B4-BE49-F238E27FC236}">
+                <a16:creationId xmlns:a16="http://schemas.microsoft.com/office/drawing/2014/main" id="{B4B428D1-38E3-4D33-8F92-C2F8B0E41A96}"/>
+              </a:ext>
+            </a:extLst>
+          </p:cNvPr>
+          <p:cNvSpPr/>
+          <p:nvPr/>
+        </p:nvSpPr>
+        <p:spPr>
+          <a:xfrm>
+            <a:off x="6088370" y="2503278"/>
+            <a:ext cx="1344596" cy="706624"/>
+          </a:xfrm>
+          <a:prstGeom prst="roundRect">
+            <a:avLst>
+              <a:gd name="adj" fmla="val 42223"/>
+            </a:avLst>
+          </a:prstGeom>
+          <a:solidFill>
+            <a:srgbClr val="FFF2CC"/>
+          </a:solidFill>
+          <a:ln w="19050">
+            <a:solidFill>
+              <a:schemeClr val="tx1"/>
+            </a:solidFill>
+          </a:ln>
+        </p:spPr>
+        <p:style>
+          <a:lnRef idx="2">
+            <a:schemeClr val="accent1">
+              <a:shade val="50000"/>
+            </a:schemeClr>
+          </a:lnRef>
+          <a:fillRef idx="1">
+            <a:schemeClr val="accent1"/>
+          </a:fillRef>
+          <a:effectRef idx="0">
+            <a:schemeClr val="accent1"/>
+          </a:effectRef>
+          <a:fontRef idx="minor">
+            <a:schemeClr val="lt1"/>
+          </a:fontRef>
+        </p:style>
+        <p:txBody>
+          <a:bodyPr rtlCol="0" anchor="ctr"/>
+          <a:lstStyle/>
+          <a:p>
+            <a:pPr algn="ctr"/>
+            <a:r>
+              <a:rPr lang="en-US" altLang="ko-KR" sz="2000">
+                <a:solidFill>
+                  <a:schemeClr val="tx1"/>
+                </a:solidFill>
+                <a:latin typeface="Arial" panose="020B0604020202020204" pitchFamily="34" charset="0"/>
+                <a:cs typeface="Arial" panose="020B0604020202020204" pitchFamily="34" charset="0"/>
+              </a:rPr>
+              <a:t>Data</a:t>
+            </a:r>
+            <a:endParaRPr lang="ko-KR" altLang="en-US" sz="2000">
+              <a:solidFill>
+                <a:schemeClr val="tx1"/>
+              </a:solidFill>
+              <a:latin typeface="Arial" panose="020B0604020202020204" pitchFamily="34" charset="0"/>
+              <a:cs typeface="Arial" panose="020B0604020202020204" pitchFamily="34" charset="0"/>
+            </a:endParaRPr>
+          </a:p>
+        </p:txBody>
+      </p:sp>
+      <p:sp>
+        <p:nvSpPr>
+          <p:cNvPr id="6" name="직사각형 5">
+            <a:extLst>
+              <a:ext uri="{FF2B5EF4-FFF2-40B4-BE49-F238E27FC236}">
+                <a16:creationId xmlns:a16="http://schemas.microsoft.com/office/drawing/2014/main" id="{EA2FFA64-2CF1-4540-B9DE-6A7F1ADD087B}"/>
+              </a:ext>
+            </a:extLst>
+          </p:cNvPr>
+          <p:cNvSpPr/>
+          <p:nvPr/>
+        </p:nvSpPr>
+        <p:spPr>
+          <a:xfrm>
+            <a:off x="6103629" y="4133126"/>
+            <a:ext cx="1329337" cy="670560"/>
+          </a:xfrm>
+          <a:prstGeom prst="rect">
+            <a:avLst/>
+          </a:prstGeom>
+          <a:solidFill>
+            <a:srgbClr val="CCCCFF"/>
+          </a:solidFill>
+          <a:ln w="19050">
+            <a:solidFill>
+              <a:schemeClr val="tx1"/>
+            </a:solidFill>
+          </a:ln>
+        </p:spPr>
+        <p:style>
+          <a:lnRef idx="2">
+            <a:schemeClr val="accent1">
+              <a:shade val="50000"/>
+            </a:schemeClr>
+          </a:lnRef>
+          <a:fillRef idx="1">
+            <a:schemeClr val="accent1"/>
+          </a:fillRef>
+          <a:effectRef idx="0">
+            <a:schemeClr val="accent1"/>
+          </a:effectRef>
+          <a:fontRef idx="minor">
+            <a:schemeClr val="lt1"/>
+          </a:fontRef>
+        </p:style>
+        <p:txBody>
+          <a:bodyPr rot="0" spcFirstLastPara="0" vertOverflow="overflow" horzOverflow="overflow" vert="horz" wrap="square" lIns="91440" tIns="45720" rIns="91440" bIns="45720" numCol="1" spcCol="0" rtlCol="0" fromWordArt="0" anchor="ctr" anchorCtr="0" forceAA="0" compatLnSpc="1">
+            <a:prstTxWarp prst="textNoShape">
+              <a:avLst/>
+            </a:prstTxWarp>
+            <a:noAutofit/>
+          </a:bodyPr>
+          <a:lstStyle/>
+          <a:p>
+            <a:pPr algn="ctr"/>
+            <a:r>
+              <a:rPr lang="en-US" altLang="ko-KR" sz="2000">
+                <a:solidFill>
+                  <a:schemeClr val="tx1"/>
+                </a:solidFill>
+                <a:latin typeface="Arial" panose="020B0604020202020204" pitchFamily="34" charset="0"/>
+                <a:cs typeface="Arial" panose="020B0604020202020204" pitchFamily="34" charset="0"/>
+              </a:rPr>
+              <a:t>Activity</a:t>
+            </a:r>
+            <a:endParaRPr lang="ko-KR" altLang="en-US" sz="2000" dirty="0">
+              <a:solidFill>
+                <a:schemeClr val="tx1"/>
+              </a:solidFill>
+              <a:latin typeface="Arial" panose="020B0604020202020204" pitchFamily="34" charset="0"/>
+              <a:cs typeface="Arial" panose="020B0604020202020204" pitchFamily="34" charset="0"/>
+            </a:endParaRPr>
+          </a:p>
+        </p:txBody>
+      </p:sp>
+      <p:cxnSp>
+        <p:nvCxnSpPr>
+          <p:cNvPr id="8" name="직선 화살표 연결선 7">
+            <a:extLst>
+              <a:ext uri="{FF2B5EF4-FFF2-40B4-BE49-F238E27FC236}">
+                <a16:creationId xmlns:a16="http://schemas.microsoft.com/office/drawing/2014/main" id="{3DCD5011-E537-4943-8AE9-A8D80FE3D872}"/>
+              </a:ext>
+            </a:extLst>
+          </p:cNvPr>
+          <p:cNvCxnSpPr>
+            <a:cxnSpLocks/>
+            <a:stCxn id="4" idx="2"/>
+            <a:endCxn id="6" idx="1"/>
+          </p:cNvCxnSpPr>
+          <p:nvPr/>
+        </p:nvCxnSpPr>
+        <p:spPr>
+          <a:xfrm>
+            <a:off x="3685721" y="4438864"/>
+            <a:ext cx="2417908" cy="29542"/>
+          </a:xfrm>
+          <a:prstGeom prst="straightConnector1">
+            <a:avLst/>
+          </a:prstGeom>
+          <a:ln w="19050">
+            <a:solidFill>
+              <a:schemeClr val="tx1"/>
+            </a:solidFill>
+            <a:headEnd type="triangle" w="lg" len="lg"/>
+            <a:tailEnd type="none"/>
+          </a:ln>
+        </p:spPr>
+        <p:style>
+          <a:lnRef idx="1">
+            <a:schemeClr val="accent1"/>
+          </a:lnRef>
+          <a:fillRef idx="0">
+            <a:schemeClr val="accent1"/>
+          </a:fillRef>
+          <a:effectRef idx="0">
+            <a:schemeClr val="accent1"/>
+          </a:effectRef>
+          <a:fontRef idx="minor">
+            <a:schemeClr val="tx1"/>
+          </a:fontRef>
+        </p:style>
+      </p:cxnSp>
+      <p:cxnSp>
+        <p:nvCxnSpPr>
+          <p:cNvPr id="9" name="직선 화살표 연결선 8">
+            <a:extLst>
+              <a:ext uri="{FF2B5EF4-FFF2-40B4-BE49-F238E27FC236}">
+                <a16:creationId xmlns:a16="http://schemas.microsoft.com/office/drawing/2014/main" id="{CE66ADBD-302D-4B82-940F-C4D611AB9A3E}"/>
+              </a:ext>
+            </a:extLst>
+          </p:cNvPr>
+          <p:cNvCxnSpPr>
+            <a:cxnSpLocks/>
+            <a:stCxn id="5" idx="2"/>
+            <a:endCxn id="6" idx="0"/>
+          </p:cNvCxnSpPr>
+          <p:nvPr/>
+        </p:nvCxnSpPr>
+        <p:spPr>
+          <a:xfrm>
+            <a:off x="6760668" y="3209902"/>
+            <a:ext cx="7630" cy="923224"/>
+          </a:xfrm>
+          <a:prstGeom prst="straightConnector1">
+            <a:avLst/>
+          </a:prstGeom>
+          <a:ln w="19050">
+            <a:solidFill>
+              <a:schemeClr val="tx1"/>
+            </a:solidFill>
+            <a:headEnd type="triangle" w="lg" len="lg"/>
+            <a:tailEnd type="triangle" w="lg" len="lg"/>
+          </a:ln>
+        </p:spPr>
+        <p:style>
+          <a:lnRef idx="1">
+            <a:schemeClr val="accent1"/>
+          </a:lnRef>
+          <a:fillRef idx="0">
+            <a:schemeClr val="accent1"/>
+          </a:fillRef>
+          <a:effectRef idx="0">
+            <a:schemeClr val="accent1"/>
+          </a:effectRef>
+          <a:fontRef idx="minor">
+            <a:schemeClr val="tx1"/>
+          </a:fontRef>
+        </p:style>
+      </p:cxnSp>
+      <p:sp>
+        <p:nvSpPr>
+          <p:cNvPr id="10" name="TextBox 9">
+            <a:extLst>
+              <a:ext uri="{FF2B5EF4-FFF2-40B4-BE49-F238E27FC236}">
+                <a16:creationId xmlns:a16="http://schemas.microsoft.com/office/drawing/2014/main" id="{8719ED7C-2E5D-405E-BE76-A35E1E4D3B87}"/>
+              </a:ext>
+            </a:extLst>
+          </p:cNvPr>
+          <p:cNvSpPr txBox="1"/>
+          <p:nvPr/>
+        </p:nvSpPr>
+        <p:spPr>
+          <a:xfrm>
+            <a:off x="6768297" y="3498112"/>
+            <a:ext cx="1682088" cy="377641"/>
+          </a:xfrm>
+          <a:prstGeom prst="rect">
+            <a:avLst/>
+          </a:prstGeom>
+          <a:noFill/>
+        </p:spPr>
+        <p:txBody>
+          <a:bodyPr wrap="square" rtlCol="0">
+            <a:spAutoFit/>
+          </a:bodyPr>
+          <a:lstStyle/>
+          <a:p>
+            <a:r>
+              <a:rPr lang="en-US" altLang="ko-KR">
+                <a:latin typeface="Arial" panose="020B0604020202020204" pitchFamily="34" charset="0"/>
+                <a:cs typeface="Arial" panose="020B0604020202020204" pitchFamily="34" charset="0"/>
+              </a:rPr>
+              <a:t>Generate</a:t>
+            </a:r>
+            <a:endParaRPr lang="ko-KR" altLang="en-US">
+              <a:latin typeface="Arial" panose="020B0604020202020204" pitchFamily="34" charset="0"/>
+              <a:cs typeface="Arial" panose="020B0604020202020204" pitchFamily="34" charset="0"/>
+            </a:endParaRPr>
+          </a:p>
+        </p:txBody>
+      </p:sp>
+      <p:sp>
+        <p:nvSpPr>
+          <p:cNvPr id="12" name="TextBox 11">
+            <a:extLst>
+              <a:ext uri="{FF2B5EF4-FFF2-40B4-BE49-F238E27FC236}">
+                <a16:creationId xmlns:a16="http://schemas.microsoft.com/office/drawing/2014/main" id="{4A8E83A3-AE12-4CBB-981E-E7D0DB152B2A}"/>
+              </a:ext>
+            </a:extLst>
+          </p:cNvPr>
+          <p:cNvSpPr txBox="1"/>
+          <p:nvPr/>
+        </p:nvSpPr>
+        <p:spPr>
+          <a:xfrm>
+            <a:off x="3844260" y="4434354"/>
+            <a:ext cx="2757869" cy="369332"/>
+          </a:xfrm>
+          <a:prstGeom prst="rect">
+            <a:avLst/>
+          </a:prstGeom>
+          <a:noFill/>
+        </p:spPr>
+        <p:txBody>
+          <a:bodyPr wrap="square" rtlCol="0">
+            <a:spAutoFit/>
+          </a:bodyPr>
+          <a:lstStyle/>
+          <a:p>
+            <a:r>
+              <a:rPr lang="en-US" altLang="ko-KR">
+                <a:latin typeface="Arial" panose="020B0604020202020204" pitchFamily="34" charset="0"/>
+                <a:cs typeface="Arial" panose="020B0604020202020204" pitchFamily="34" charset="0"/>
+              </a:rPr>
+              <a:t>Act / Send / Receive</a:t>
+            </a:r>
+            <a:endParaRPr lang="ko-KR" altLang="en-US">
+              <a:latin typeface="Arial" panose="020B0604020202020204" pitchFamily="34" charset="0"/>
+              <a:cs typeface="Arial" panose="020B0604020202020204" pitchFamily="34" charset="0"/>
+            </a:endParaRPr>
+          </a:p>
+        </p:txBody>
+      </p:sp>
+      <p:sp>
+        <p:nvSpPr>
+          <p:cNvPr id="13" name="TextBox 12">
+            <a:extLst>
+              <a:ext uri="{FF2B5EF4-FFF2-40B4-BE49-F238E27FC236}">
+                <a16:creationId xmlns:a16="http://schemas.microsoft.com/office/drawing/2014/main" id="{12BD5A96-80F9-4B8F-AF00-A8438988AD4B}"/>
+              </a:ext>
+            </a:extLst>
+          </p:cNvPr>
+          <p:cNvSpPr txBox="1"/>
+          <p:nvPr/>
+        </p:nvSpPr>
+        <p:spPr>
+          <a:xfrm>
+            <a:off x="7432966" y="4204169"/>
+            <a:ext cx="998289" cy="523220"/>
+          </a:xfrm>
+          <a:prstGeom prst="rect">
+            <a:avLst/>
+          </a:prstGeom>
+          <a:noFill/>
+        </p:spPr>
+        <p:txBody>
+          <a:bodyPr wrap="square" rtlCol="0">
+            <a:spAutoFit/>
+          </a:bodyPr>
+          <a:lstStyle/>
+          <a:p>
+            <a:r>
+              <a:rPr lang="en-US" altLang="ko-KR" sz="1400">
+                <a:latin typeface="Arial" panose="020B0604020202020204" pitchFamily="34" charset="0"/>
+                <a:cs typeface="Arial" panose="020B0604020202020204" pitchFamily="34" charset="0"/>
+              </a:rPr>
+              <a:t>: name</a:t>
+            </a:r>
+          </a:p>
+          <a:p>
+            <a:r>
+              <a:rPr lang="en-US" altLang="ko-KR" sz="1400">
+                <a:latin typeface="Arial" panose="020B0604020202020204" pitchFamily="34" charset="0"/>
+                <a:cs typeface="Arial" panose="020B0604020202020204" pitchFamily="34" charset="0"/>
+              </a:rPr>
+              <a:t>: date </a:t>
+            </a:r>
+            <a:endParaRPr lang="ko-KR" altLang="en-US" sz="1400">
+              <a:latin typeface="Arial" panose="020B0604020202020204" pitchFamily="34" charset="0"/>
+              <a:cs typeface="Arial" panose="020B0604020202020204" pitchFamily="34" charset="0"/>
+            </a:endParaRPr>
+          </a:p>
+        </p:txBody>
+      </p:sp>
+      <p:sp>
+        <p:nvSpPr>
+          <p:cNvPr id="14" name="TextBox 13">
+            <a:extLst>
+              <a:ext uri="{FF2B5EF4-FFF2-40B4-BE49-F238E27FC236}">
+                <a16:creationId xmlns:a16="http://schemas.microsoft.com/office/drawing/2014/main" id="{2C438A6C-5AAA-4C31-9F46-E42A8041ED18}"/>
+              </a:ext>
+            </a:extLst>
+          </p:cNvPr>
+          <p:cNvSpPr txBox="1"/>
+          <p:nvPr/>
+        </p:nvSpPr>
+        <p:spPr>
+          <a:xfrm>
+            <a:off x="1422364" y="4158705"/>
+            <a:ext cx="998289" cy="523220"/>
+          </a:xfrm>
+          <a:prstGeom prst="rect">
+            <a:avLst/>
+          </a:prstGeom>
+          <a:noFill/>
+        </p:spPr>
+        <p:txBody>
+          <a:bodyPr wrap="square" rtlCol="0">
+            <a:spAutoFit/>
+          </a:bodyPr>
+          <a:lstStyle/>
+          <a:p>
+            <a:r>
+              <a:rPr lang="en-US" altLang="ko-KR" sz="1400">
+                <a:latin typeface="Arial" panose="020B0604020202020204" pitchFamily="34" charset="0"/>
+                <a:cs typeface="Arial" panose="020B0604020202020204" pitchFamily="34" charset="0"/>
+              </a:rPr>
+              <a:t>: name</a:t>
+            </a:r>
+          </a:p>
+          <a:p>
+            <a:r>
+              <a:rPr lang="en-US" altLang="ko-KR" sz="1400">
+                <a:latin typeface="Arial" panose="020B0604020202020204" pitchFamily="34" charset="0"/>
+                <a:cs typeface="Arial" panose="020B0604020202020204" pitchFamily="34" charset="0"/>
+              </a:rPr>
+              <a:t>: affiliation </a:t>
+            </a:r>
+            <a:endParaRPr lang="ko-KR" altLang="en-US" sz="1400">
+              <a:latin typeface="Arial" panose="020B0604020202020204" pitchFamily="34" charset="0"/>
+              <a:cs typeface="Arial" panose="020B0604020202020204" pitchFamily="34" charset="0"/>
+            </a:endParaRPr>
+          </a:p>
+        </p:txBody>
+      </p:sp>
+      <p:sp>
+        <p:nvSpPr>
+          <p:cNvPr id="16" name="TextBox 15">
+            <a:extLst>
+              <a:ext uri="{FF2B5EF4-FFF2-40B4-BE49-F238E27FC236}">
+                <a16:creationId xmlns:a16="http://schemas.microsoft.com/office/drawing/2014/main" id="{96C68945-FC83-4FDC-9CD8-1527305C2E5F}"/>
+              </a:ext>
+            </a:extLst>
+          </p:cNvPr>
+          <p:cNvSpPr txBox="1"/>
+          <p:nvPr/>
+        </p:nvSpPr>
+        <p:spPr>
+          <a:xfrm>
+            <a:off x="7479763" y="2516915"/>
+            <a:ext cx="904694" cy="523220"/>
+          </a:xfrm>
+          <a:prstGeom prst="rect">
+            <a:avLst/>
+          </a:prstGeom>
+          <a:noFill/>
+        </p:spPr>
+        <p:txBody>
+          <a:bodyPr wrap="square" rtlCol="0">
+            <a:spAutoFit/>
+          </a:bodyPr>
+          <a:lstStyle/>
+          <a:p>
+            <a:r>
+              <a:rPr lang="en-US" altLang="ko-KR" sz="1400">
+                <a:latin typeface="Arial" panose="020B0604020202020204" pitchFamily="34" charset="0"/>
+                <a:cs typeface="Arial" panose="020B0604020202020204" pitchFamily="34" charset="0"/>
+              </a:rPr>
+              <a:t>: name</a:t>
+            </a:r>
+          </a:p>
+          <a:p>
+            <a:r>
+              <a:rPr lang="en-US" altLang="ko-KR" sz="1400">
+                <a:latin typeface="Arial" panose="020B0604020202020204" pitchFamily="34" charset="0"/>
+                <a:cs typeface="Arial" panose="020B0604020202020204" pitchFamily="34" charset="0"/>
+              </a:rPr>
+              <a:t>: price</a:t>
+            </a:r>
+          </a:p>
+        </p:txBody>
+      </p:sp>
+      <p:sp>
+        <p:nvSpPr>
+          <p:cNvPr id="17" name="제목 1">
+            <a:extLst>
+              <a:ext uri="{FF2B5EF4-FFF2-40B4-BE49-F238E27FC236}">
+                <a16:creationId xmlns:a16="http://schemas.microsoft.com/office/drawing/2014/main" id="{51DCDD7D-F028-4062-8BD1-792B89D86504}"/>
+              </a:ext>
+            </a:extLst>
+          </p:cNvPr>
+          <p:cNvSpPr>
+            <a:spLocks noGrp="1"/>
+          </p:cNvSpPr>
+          <p:nvPr>
+            <p:ph type="title"/>
+          </p:nvPr>
+        </p:nvSpPr>
+        <p:spPr>
+          <a:xfrm>
+            <a:off x="838200" y="365125"/>
+            <a:ext cx="10515600" cy="1325563"/>
+          </a:xfrm>
+        </p:spPr>
+        <p:txBody>
+          <a:bodyPr/>
+          <a:lstStyle/>
+          <a:p>
+            <a:r>
+              <a:rPr lang="en-US" altLang="ko-KR"/>
+              <a:t>Version 2.0</a:t>
+            </a:r>
+            <a:endParaRPr lang="ko-KR" altLang="en-US"/>
+          </a:p>
+        </p:txBody>
+      </p:sp>
+      <p:sp>
+        <p:nvSpPr>
+          <p:cNvPr id="19" name="TextBox 18">
+            <a:extLst>
+              <a:ext uri="{FF2B5EF4-FFF2-40B4-BE49-F238E27FC236}">
+                <a16:creationId xmlns:a16="http://schemas.microsoft.com/office/drawing/2014/main" id="{6EAC8319-C906-4572-8090-EDD7CA747694}"/>
+              </a:ext>
+            </a:extLst>
+          </p:cNvPr>
+          <p:cNvSpPr txBox="1"/>
+          <p:nvPr/>
+        </p:nvSpPr>
+        <p:spPr>
+          <a:xfrm>
+            <a:off x="8292678" y="2516915"/>
+            <a:ext cx="1279029" cy="523220"/>
+          </a:xfrm>
+          <a:prstGeom prst="rect">
+            <a:avLst/>
+          </a:prstGeom>
+          <a:noFill/>
+        </p:spPr>
+        <p:txBody>
+          <a:bodyPr wrap="square" rtlCol="0">
+            <a:spAutoFit/>
+          </a:bodyPr>
+          <a:lstStyle/>
+          <a:p>
+            <a:r>
+              <a:rPr lang="en-US" altLang="ko-KR" sz="1400">
+                <a:latin typeface="Arial" panose="020B0604020202020204" pitchFamily="34" charset="0"/>
+                <a:cs typeface="Arial" panose="020B0604020202020204" pitchFamily="34" charset="0"/>
+              </a:rPr>
+              <a:t>: d_type</a:t>
+            </a:r>
+          </a:p>
+          <a:p>
+            <a:r>
+              <a:rPr lang="en-US" altLang="ko-KR" sz="1400">
+                <a:latin typeface="Arial" panose="020B0604020202020204" pitchFamily="34" charset="0"/>
+                <a:cs typeface="Arial" panose="020B0604020202020204" pitchFamily="34" charset="0"/>
+              </a:rPr>
+              <a:t>: device</a:t>
+            </a:r>
+          </a:p>
+        </p:txBody>
+      </p:sp>
+    </p:spTree>
+    <p:extLst>
+      <p:ext uri="{BB962C8B-B14F-4D97-AF65-F5344CB8AC3E}">
+        <p14:creationId xmlns:p14="http://schemas.microsoft.com/office/powerpoint/2010/main" val="968294773"/>
+      </p:ext>
+    </p:extLst>
+  </p:cSld>
+  <p:clrMapOvr>
+    <a:masterClrMapping/>
+  </p:clrMapOvr>
+</p:sld>
+</file>
+
+<file path=ppt/slides/slide15.xml><?xml version="1.0" encoding="utf-8"?>
+<p:sld xmlns:a="http://schemas.openxmlformats.org/drawingml/2006/main" xmlns:r="http://schemas.openxmlformats.org/officeDocument/2006/relationships" xmlns:p="http://schemas.openxmlformats.org/presentationml/2006/main">
+  <p:cSld>
+    <p:spTree>
+      <p:nvGrpSpPr>
+        <p:cNvPr id="1" name=""/>
+        <p:cNvGrpSpPr/>
+        <p:nvPr/>
+      </p:nvGrpSpPr>
+      <p:grpSpPr>
+        <a:xfrm>
+          <a:off x="0" y="0"/>
+          <a:ext cx="0" cy="0"/>
+          <a:chOff x="0" y="0"/>
+          <a:chExt cx="0" cy="0"/>
+        </a:xfrm>
+      </p:grpSpPr>
+      <p:sp>
+        <p:nvSpPr>
+          <p:cNvPr id="4" name="화살표: 오각형 3">
+            <a:extLst>
+              <a:ext uri="{FF2B5EF4-FFF2-40B4-BE49-F238E27FC236}">
+                <a16:creationId xmlns:a16="http://schemas.microsoft.com/office/drawing/2014/main" id="{B15A06DF-DFFD-4319-AE40-E07BE51C3A98}"/>
+              </a:ext>
+            </a:extLst>
+          </p:cNvPr>
+          <p:cNvSpPr/>
+          <p:nvPr/>
+        </p:nvSpPr>
+        <p:spPr>
+          <a:xfrm rot="16200000">
+            <a:off x="6383409" y="3064674"/>
+            <a:ext cx="806172" cy="1265067"/>
+          </a:xfrm>
+          <a:prstGeom prst="homePlate">
+            <a:avLst>
+              <a:gd name="adj" fmla="val 39700"/>
+            </a:avLst>
+          </a:prstGeom>
+          <a:solidFill>
+            <a:srgbClr val="E5E57F"/>
+          </a:solidFill>
+          <a:ln w="19050">
+            <a:solidFill>
+              <a:schemeClr val="tx1"/>
+            </a:solidFill>
+          </a:ln>
+        </p:spPr>
+        <p:style>
+          <a:lnRef idx="2">
+            <a:schemeClr val="accent1">
+              <a:shade val="50000"/>
+            </a:schemeClr>
+          </a:lnRef>
+          <a:fillRef idx="1">
+            <a:schemeClr val="accent1"/>
+          </a:fillRef>
+          <a:effectRef idx="0">
+            <a:schemeClr val="accent1"/>
+          </a:effectRef>
+          <a:fontRef idx="minor">
+            <a:schemeClr val="lt1"/>
+          </a:fontRef>
+        </p:style>
+        <p:txBody>
+          <a:bodyPr vert="eaVert" rtlCol="0" anchor="ctr"/>
+          <a:lstStyle/>
+          <a:p>
+            <a:pPr algn="ctr"/>
+            <a:r>
+              <a:rPr lang="en-US" altLang="ko-KR" sz="2000">
+                <a:solidFill>
+                  <a:schemeClr val="tx1"/>
+                </a:solidFill>
+                <a:latin typeface="Arial" panose="020B0604020202020204" pitchFamily="34" charset="0"/>
+                <a:cs typeface="Arial" panose="020B0604020202020204" pitchFamily="34" charset="0"/>
+              </a:rPr>
+              <a:t>Person</a:t>
+            </a:r>
+            <a:endParaRPr lang="ko-KR" altLang="en-US" sz="2000">
+              <a:solidFill>
+                <a:schemeClr val="tx1"/>
+              </a:solidFill>
+              <a:latin typeface="Arial" panose="020B0604020202020204" pitchFamily="34" charset="0"/>
+              <a:cs typeface="Arial" panose="020B0604020202020204" pitchFamily="34" charset="0"/>
+            </a:endParaRPr>
+          </a:p>
+        </p:txBody>
+      </p:sp>
+      <p:sp>
+        <p:nvSpPr>
+          <p:cNvPr id="5" name="사각형: 둥근 모서리 4">
+            <a:extLst>
+              <a:ext uri="{FF2B5EF4-FFF2-40B4-BE49-F238E27FC236}">
+                <a16:creationId xmlns:a16="http://schemas.microsoft.com/office/drawing/2014/main" id="{B4B428D1-38E3-4D33-8F92-C2F8B0E41A96}"/>
+              </a:ext>
+            </a:extLst>
+          </p:cNvPr>
+          <p:cNvSpPr/>
+          <p:nvPr/>
+        </p:nvSpPr>
+        <p:spPr>
+          <a:xfrm>
+            <a:off x="6153961" y="1931815"/>
+            <a:ext cx="1344596" cy="706624"/>
+          </a:xfrm>
+          <a:prstGeom prst="roundRect">
+            <a:avLst>
+              <a:gd name="adj" fmla="val 42223"/>
+            </a:avLst>
+          </a:prstGeom>
+          <a:solidFill>
+            <a:srgbClr val="FFF2CC"/>
+          </a:solidFill>
+          <a:ln w="19050">
+            <a:solidFill>
+              <a:schemeClr val="tx1"/>
+            </a:solidFill>
+          </a:ln>
+        </p:spPr>
+        <p:style>
+          <a:lnRef idx="2">
+            <a:schemeClr val="accent1">
+              <a:shade val="50000"/>
+            </a:schemeClr>
+          </a:lnRef>
+          <a:fillRef idx="1">
+            <a:schemeClr val="accent1"/>
+          </a:fillRef>
+          <a:effectRef idx="0">
+            <a:schemeClr val="accent1"/>
+          </a:effectRef>
+          <a:fontRef idx="minor">
+            <a:schemeClr val="lt1"/>
+          </a:fontRef>
+        </p:style>
+        <p:txBody>
+          <a:bodyPr rtlCol="0" anchor="ctr"/>
+          <a:lstStyle/>
+          <a:p>
+            <a:pPr algn="ctr"/>
+            <a:r>
+              <a:rPr lang="en-US" altLang="ko-KR" sz="2000">
+                <a:solidFill>
+                  <a:schemeClr val="tx1"/>
+                </a:solidFill>
+                <a:latin typeface="Arial" panose="020B0604020202020204" pitchFamily="34" charset="0"/>
+                <a:cs typeface="Arial" panose="020B0604020202020204" pitchFamily="34" charset="0"/>
+              </a:rPr>
+              <a:t>Data</a:t>
+            </a:r>
+            <a:endParaRPr lang="ko-KR" altLang="en-US" sz="2000">
+              <a:solidFill>
+                <a:schemeClr val="tx1"/>
+              </a:solidFill>
+              <a:latin typeface="Arial" panose="020B0604020202020204" pitchFamily="34" charset="0"/>
+              <a:cs typeface="Arial" panose="020B0604020202020204" pitchFamily="34" charset="0"/>
+            </a:endParaRPr>
+          </a:p>
+        </p:txBody>
+      </p:sp>
+      <p:sp>
+        <p:nvSpPr>
+          <p:cNvPr id="6" name="직사각형 5">
+            <a:extLst>
+              <a:ext uri="{FF2B5EF4-FFF2-40B4-BE49-F238E27FC236}">
+                <a16:creationId xmlns:a16="http://schemas.microsoft.com/office/drawing/2014/main" id="{EA2FFA64-2CF1-4540-B9DE-6A7F1ADD087B}"/>
+              </a:ext>
+            </a:extLst>
+          </p:cNvPr>
+          <p:cNvSpPr/>
+          <p:nvPr/>
+        </p:nvSpPr>
+        <p:spPr>
+          <a:xfrm>
+            <a:off x="2558445" y="2741044"/>
+            <a:ext cx="1329337" cy="670560"/>
+          </a:xfrm>
+          <a:prstGeom prst="rect">
+            <a:avLst/>
+          </a:prstGeom>
+          <a:solidFill>
+            <a:srgbClr val="CCCCFF"/>
+          </a:solidFill>
+          <a:ln w="19050">
+            <a:solidFill>
+              <a:schemeClr val="tx1"/>
+            </a:solidFill>
+          </a:ln>
+        </p:spPr>
+        <p:style>
+          <a:lnRef idx="2">
+            <a:schemeClr val="accent1">
+              <a:shade val="50000"/>
+            </a:schemeClr>
+          </a:lnRef>
+          <a:fillRef idx="1">
+            <a:schemeClr val="accent1"/>
+          </a:fillRef>
+          <a:effectRef idx="0">
+            <a:schemeClr val="accent1"/>
+          </a:effectRef>
+          <a:fontRef idx="minor">
+            <a:schemeClr val="lt1"/>
+          </a:fontRef>
+        </p:style>
+        <p:txBody>
+          <a:bodyPr rot="0" spcFirstLastPara="0" vertOverflow="overflow" horzOverflow="overflow" vert="horz" wrap="square" lIns="91440" tIns="45720" rIns="91440" bIns="45720" numCol="1" spcCol="0" rtlCol="0" fromWordArt="0" anchor="ctr" anchorCtr="0" forceAA="0" compatLnSpc="1">
+            <a:prstTxWarp prst="textNoShape">
+              <a:avLst/>
+            </a:prstTxWarp>
+            <a:noAutofit/>
+          </a:bodyPr>
+          <a:lstStyle/>
+          <a:p>
+            <a:pPr algn="ctr"/>
+            <a:r>
+              <a:rPr lang="en-US" altLang="ko-KR" sz="2000">
+                <a:solidFill>
+                  <a:schemeClr val="tx1"/>
+                </a:solidFill>
+                <a:latin typeface="Arial" panose="020B0604020202020204" pitchFamily="34" charset="0"/>
+                <a:cs typeface="Arial" panose="020B0604020202020204" pitchFamily="34" charset="0"/>
+              </a:rPr>
+              <a:t>Activity</a:t>
+            </a:r>
+            <a:endParaRPr lang="ko-KR" altLang="en-US" sz="2000" dirty="0">
+              <a:solidFill>
+                <a:schemeClr val="tx1"/>
+              </a:solidFill>
+              <a:latin typeface="Arial" panose="020B0604020202020204" pitchFamily="34" charset="0"/>
+              <a:cs typeface="Arial" panose="020B0604020202020204" pitchFamily="34" charset="0"/>
+            </a:endParaRPr>
+          </a:p>
+        </p:txBody>
+      </p:sp>
+      <p:cxnSp>
+        <p:nvCxnSpPr>
+          <p:cNvPr id="8" name="직선 화살표 연결선 7">
+            <a:extLst>
+              <a:ext uri="{FF2B5EF4-FFF2-40B4-BE49-F238E27FC236}">
+                <a16:creationId xmlns:a16="http://schemas.microsoft.com/office/drawing/2014/main" id="{3DCD5011-E537-4943-8AE9-A8D80FE3D872}"/>
+              </a:ext>
+            </a:extLst>
+          </p:cNvPr>
+          <p:cNvCxnSpPr>
+            <a:cxnSpLocks/>
+            <a:endCxn id="6" idx="3"/>
+          </p:cNvCxnSpPr>
+          <p:nvPr/>
+        </p:nvCxnSpPr>
+        <p:spPr>
+          <a:xfrm flipH="1" flipV="1">
+            <a:off x="3887782" y="3076324"/>
+            <a:ext cx="2266179" cy="860033"/>
+          </a:xfrm>
+          <a:prstGeom prst="straightConnector1">
+            <a:avLst/>
+          </a:prstGeom>
+          <a:ln w="19050">
+            <a:solidFill>
+              <a:schemeClr val="tx1"/>
+            </a:solidFill>
+            <a:headEnd type="triangle" w="lg" len="lg"/>
+            <a:tailEnd type="none"/>
+          </a:ln>
+        </p:spPr>
+        <p:style>
+          <a:lnRef idx="1">
+            <a:schemeClr val="accent1"/>
+          </a:lnRef>
+          <a:fillRef idx="0">
+            <a:schemeClr val="accent1"/>
+          </a:fillRef>
+          <a:effectRef idx="0">
+            <a:schemeClr val="accent1"/>
+          </a:effectRef>
+          <a:fontRef idx="minor">
+            <a:schemeClr val="tx1"/>
+          </a:fontRef>
+        </p:style>
+      </p:cxnSp>
+      <p:cxnSp>
+        <p:nvCxnSpPr>
+          <p:cNvPr id="9" name="직선 화살표 연결선 8">
+            <a:extLst>
+              <a:ext uri="{FF2B5EF4-FFF2-40B4-BE49-F238E27FC236}">
+                <a16:creationId xmlns:a16="http://schemas.microsoft.com/office/drawing/2014/main" id="{CE66ADBD-302D-4B82-940F-C4D611AB9A3E}"/>
+              </a:ext>
+            </a:extLst>
+          </p:cNvPr>
+          <p:cNvCxnSpPr>
+            <a:cxnSpLocks/>
+            <a:stCxn id="5" idx="1"/>
+            <a:endCxn id="6" idx="3"/>
+          </p:cNvCxnSpPr>
+          <p:nvPr/>
+        </p:nvCxnSpPr>
+        <p:spPr>
+          <a:xfrm flipH="1">
+            <a:off x="3887782" y="2285127"/>
+            <a:ext cx="2266179" cy="791197"/>
+          </a:xfrm>
+          <a:prstGeom prst="straightConnector1">
+            <a:avLst/>
+          </a:prstGeom>
+          <a:ln w="19050">
+            <a:solidFill>
+              <a:schemeClr val="tx1"/>
+            </a:solidFill>
+            <a:headEnd type="triangle" w="lg" len="lg"/>
+            <a:tailEnd type="triangle" w="lg" len="lg"/>
+          </a:ln>
+        </p:spPr>
+        <p:style>
+          <a:lnRef idx="1">
+            <a:schemeClr val="accent1"/>
+          </a:lnRef>
+          <a:fillRef idx="0">
+            <a:schemeClr val="accent1"/>
+          </a:fillRef>
+          <a:effectRef idx="0">
+            <a:schemeClr val="accent1"/>
+          </a:effectRef>
+          <a:fontRef idx="minor">
+            <a:schemeClr val="tx1"/>
+          </a:fontRef>
+        </p:style>
+      </p:cxnSp>
+      <p:sp>
+        <p:nvSpPr>
+          <p:cNvPr id="10" name="TextBox 9">
+            <a:extLst>
+              <a:ext uri="{FF2B5EF4-FFF2-40B4-BE49-F238E27FC236}">
+                <a16:creationId xmlns:a16="http://schemas.microsoft.com/office/drawing/2014/main" id="{8719ED7C-2E5D-405E-BE76-A35E1E4D3B87}"/>
+              </a:ext>
+            </a:extLst>
+          </p:cNvPr>
+          <p:cNvSpPr txBox="1"/>
+          <p:nvPr/>
+        </p:nvSpPr>
+        <p:spPr>
+          <a:xfrm rot="20374871">
+            <a:off x="4400882" y="2230642"/>
+            <a:ext cx="1682088" cy="377641"/>
+          </a:xfrm>
+          <a:prstGeom prst="rect">
+            <a:avLst/>
+          </a:prstGeom>
+          <a:noFill/>
+        </p:spPr>
+        <p:txBody>
+          <a:bodyPr wrap="square" rtlCol="0">
+            <a:spAutoFit/>
+          </a:bodyPr>
+          <a:lstStyle/>
+          <a:p>
+            <a:r>
+              <a:rPr lang="en-US" altLang="ko-KR">
+                <a:latin typeface="Arial" panose="020B0604020202020204" pitchFamily="34" charset="0"/>
+                <a:cs typeface="Arial" panose="020B0604020202020204" pitchFamily="34" charset="0"/>
+              </a:rPr>
+              <a:t>Generate</a:t>
+            </a:r>
+            <a:endParaRPr lang="ko-KR" altLang="en-US">
+              <a:latin typeface="Arial" panose="020B0604020202020204" pitchFamily="34" charset="0"/>
+              <a:cs typeface="Arial" panose="020B0604020202020204" pitchFamily="34" charset="0"/>
+            </a:endParaRPr>
+          </a:p>
+        </p:txBody>
+      </p:sp>
+      <p:sp>
+        <p:nvSpPr>
+          <p:cNvPr id="12" name="TextBox 11">
+            <a:extLst>
+              <a:ext uri="{FF2B5EF4-FFF2-40B4-BE49-F238E27FC236}">
+                <a16:creationId xmlns:a16="http://schemas.microsoft.com/office/drawing/2014/main" id="{4A8E83A3-AE12-4CBB-981E-E7D0DB152B2A}"/>
+              </a:ext>
+            </a:extLst>
+          </p:cNvPr>
+          <p:cNvSpPr txBox="1"/>
+          <p:nvPr/>
+        </p:nvSpPr>
+        <p:spPr>
+          <a:xfrm rot="1253343">
+            <a:off x="3837825" y="3580968"/>
+            <a:ext cx="2757869" cy="369332"/>
+          </a:xfrm>
+          <a:prstGeom prst="rect">
+            <a:avLst/>
+          </a:prstGeom>
+          <a:noFill/>
+        </p:spPr>
+        <p:txBody>
+          <a:bodyPr wrap="square" rtlCol="0">
+            <a:spAutoFit/>
+          </a:bodyPr>
+          <a:lstStyle/>
+          <a:p>
+            <a:r>
+              <a:rPr lang="en-US" altLang="ko-KR">
+                <a:latin typeface="Arial" panose="020B0604020202020204" pitchFamily="34" charset="0"/>
+                <a:cs typeface="Arial" panose="020B0604020202020204" pitchFamily="34" charset="0"/>
+              </a:rPr>
+              <a:t>Act / Send / Receive</a:t>
+            </a:r>
+            <a:endParaRPr lang="ko-KR" altLang="en-US">
+              <a:latin typeface="Arial" panose="020B0604020202020204" pitchFamily="34" charset="0"/>
+              <a:cs typeface="Arial" panose="020B0604020202020204" pitchFamily="34" charset="0"/>
+            </a:endParaRPr>
+          </a:p>
+        </p:txBody>
+      </p:sp>
+      <p:sp>
+        <p:nvSpPr>
+          <p:cNvPr id="13" name="TextBox 12">
+            <a:extLst>
+              <a:ext uri="{FF2B5EF4-FFF2-40B4-BE49-F238E27FC236}">
+                <a16:creationId xmlns:a16="http://schemas.microsoft.com/office/drawing/2014/main" id="{12BD5A96-80F9-4B8F-AF00-A8438988AD4B}"/>
+              </a:ext>
+            </a:extLst>
+          </p:cNvPr>
+          <p:cNvSpPr txBox="1"/>
+          <p:nvPr/>
+        </p:nvSpPr>
+        <p:spPr>
+          <a:xfrm>
+            <a:off x="1757948" y="2814714"/>
+            <a:ext cx="998289" cy="523220"/>
+          </a:xfrm>
+          <a:prstGeom prst="rect">
+            <a:avLst/>
+          </a:prstGeom>
+          <a:noFill/>
+        </p:spPr>
+        <p:txBody>
+          <a:bodyPr wrap="square" rtlCol="0">
+            <a:spAutoFit/>
+          </a:bodyPr>
+          <a:lstStyle/>
+          <a:p>
+            <a:r>
+              <a:rPr lang="en-US" altLang="ko-KR" sz="1400">
+                <a:latin typeface="Arial" panose="020B0604020202020204" pitchFamily="34" charset="0"/>
+                <a:cs typeface="Arial" panose="020B0604020202020204" pitchFamily="34" charset="0"/>
+              </a:rPr>
+              <a:t>: name</a:t>
+            </a:r>
+          </a:p>
+          <a:p>
+            <a:r>
+              <a:rPr lang="en-US" altLang="ko-KR" sz="1400">
+                <a:latin typeface="Arial" panose="020B0604020202020204" pitchFamily="34" charset="0"/>
+                <a:cs typeface="Arial" panose="020B0604020202020204" pitchFamily="34" charset="0"/>
+              </a:rPr>
+              <a:t>: date </a:t>
+            </a:r>
+            <a:endParaRPr lang="ko-KR" altLang="en-US" sz="1400">
+              <a:latin typeface="Arial" panose="020B0604020202020204" pitchFamily="34" charset="0"/>
+              <a:cs typeface="Arial" panose="020B0604020202020204" pitchFamily="34" charset="0"/>
+            </a:endParaRPr>
+          </a:p>
+        </p:txBody>
+      </p:sp>
+      <p:sp>
+        <p:nvSpPr>
+          <p:cNvPr id="14" name="TextBox 13">
+            <a:extLst>
+              <a:ext uri="{FF2B5EF4-FFF2-40B4-BE49-F238E27FC236}">
+                <a16:creationId xmlns:a16="http://schemas.microsoft.com/office/drawing/2014/main" id="{2C438A6C-5AAA-4C31-9F46-E42A8041ED18}"/>
+              </a:ext>
+            </a:extLst>
+          </p:cNvPr>
+          <p:cNvSpPr txBox="1"/>
+          <p:nvPr/>
+        </p:nvSpPr>
+        <p:spPr>
+          <a:xfrm>
+            <a:off x="7503746" y="3577074"/>
+            <a:ext cx="998289" cy="523220"/>
+          </a:xfrm>
+          <a:prstGeom prst="rect">
+            <a:avLst/>
+          </a:prstGeom>
+          <a:noFill/>
+        </p:spPr>
+        <p:txBody>
+          <a:bodyPr wrap="square" rtlCol="0">
+            <a:spAutoFit/>
+          </a:bodyPr>
+          <a:lstStyle/>
+          <a:p>
+            <a:r>
+              <a:rPr lang="en-US" altLang="ko-KR" sz="1400">
+                <a:latin typeface="Arial" panose="020B0604020202020204" pitchFamily="34" charset="0"/>
+                <a:cs typeface="Arial" panose="020B0604020202020204" pitchFamily="34" charset="0"/>
+              </a:rPr>
+              <a:t>: name</a:t>
+            </a:r>
+          </a:p>
+          <a:p>
+            <a:r>
+              <a:rPr lang="en-US" altLang="ko-KR" sz="1400">
+                <a:latin typeface="Arial" panose="020B0604020202020204" pitchFamily="34" charset="0"/>
+                <a:cs typeface="Arial" panose="020B0604020202020204" pitchFamily="34" charset="0"/>
+              </a:rPr>
+              <a:t>: affiliation </a:t>
+            </a:r>
+            <a:endParaRPr lang="ko-KR" altLang="en-US" sz="1400">
+              <a:latin typeface="Arial" panose="020B0604020202020204" pitchFamily="34" charset="0"/>
+              <a:cs typeface="Arial" panose="020B0604020202020204" pitchFamily="34" charset="0"/>
+            </a:endParaRPr>
+          </a:p>
+        </p:txBody>
+      </p:sp>
+      <p:sp>
+        <p:nvSpPr>
+          <p:cNvPr id="16" name="TextBox 15">
+            <a:extLst>
+              <a:ext uri="{FF2B5EF4-FFF2-40B4-BE49-F238E27FC236}">
+                <a16:creationId xmlns:a16="http://schemas.microsoft.com/office/drawing/2014/main" id="{96C68945-FC83-4FDC-9CD8-1527305C2E5F}"/>
+              </a:ext>
+            </a:extLst>
+          </p:cNvPr>
+          <p:cNvSpPr txBox="1"/>
+          <p:nvPr/>
+        </p:nvSpPr>
+        <p:spPr>
+          <a:xfrm>
+            <a:off x="7550544" y="2023517"/>
+            <a:ext cx="904694" cy="523220"/>
+          </a:xfrm>
+          <a:prstGeom prst="rect">
+            <a:avLst/>
+          </a:prstGeom>
+          <a:noFill/>
+        </p:spPr>
+        <p:txBody>
+          <a:bodyPr wrap="square" rtlCol="0">
+            <a:spAutoFit/>
+          </a:bodyPr>
+          <a:lstStyle/>
+          <a:p>
+            <a:r>
+              <a:rPr lang="en-US" altLang="ko-KR" sz="1400">
+                <a:latin typeface="Arial" panose="020B0604020202020204" pitchFamily="34" charset="0"/>
+                <a:cs typeface="Arial" panose="020B0604020202020204" pitchFamily="34" charset="0"/>
+              </a:rPr>
+              <a:t>: name</a:t>
+            </a:r>
+          </a:p>
+          <a:p>
+            <a:r>
+              <a:rPr lang="en-US" altLang="ko-KR" sz="1400">
+                <a:latin typeface="Arial" panose="020B0604020202020204" pitchFamily="34" charset="0"/>
+                <a:cs typeface="Arial" panose="020B0604020202020204" pitchFamily="34" charset="0"/>
+              </a:rPr>
+              <a:t>: price</a:t>
+            </a:r>
+          </a:p>
+        </p:txBody>
+      </p:sp>
+      <p:sp>
+        <p:nvSpPr>
+          <p:cNvPr id="19" name="TextBox 18">
+            <a:extLst>
+              <a:ext uri="{FF2B5EF4-FFF2-40B4-BE49-F238E27FC236}">
+                <a16:creationId xmlns:a16="http://schemas.microsoft.com/office/drawing/2014/main" id="{6EAC8319-C906-4572-8090-EDD7CA747694}"/>
+              </a:ext>
+            </a:extLst>
+          </p:cNvPr>
+          <p:cNvSpPr txBox="1"/>
+          <p:nvPr/>
+        </p:nvSpPr>
+        <p:spPr>
+          <a:xfrm>
+            <a:off x="8363459" y="2023517"/>
+            <a:ext cx="1279029" cy="523220"/>
+          </a:xfrm>
+          <a:prstGeom prst="rect">
+            <a:avLst/>
+          </a:prstGeom>
+          <a:noFill/>
+        </p:spPr>
+        <p:txBody>
+          <a:bodyPr wrap="square" rtlCol="0">
+            <a:spAutoFit/>
+          </a:bodyPr>
+          <a:lstStyle/>
+          <a:p>
+            <a:r>
+              <a:rPr lang="en-US" altLang="ko-KR" sz="1400">
+                <a:latin typeface="Arial" panose="020B0604020202020204" pitchFamily="34" charset="0"/>
+                <a:cs typeface="Arial" panose="020B0604020202020204" pitchFamily="34" charset="0"/>
+              </a:rPr>
+              <a:t>: d_type</a:t>
+            </a:r>
+          </a:p>
+          <a:p>
+            <a:r>
+              <a:rPr lang="en-US" altLang="ko-KR" sz="1400">
+                <a:latin typeface="Arial" panose="020B0604020202020204" pitchFamily="34" charset="0"/>
+                <a:cs typeface="Arial" panose="020B0604020202020204" pitchFamily="34" charset="0"/>
+              </a:rPr>
+              <a:t>: device</a:t>
+            </a:r>
+          </a:p>
+        </p:txBody>
+      </p:sp>
+    </p:spTree>
+    <p:extLst>
+      <p:ext uri="{BB962C8B-B14F-4D97-AF65-F5344CB8AC3E}">
+        <p14:creationId xmlns:p14="http://schemas.microsoft.com/office/powerpoint/2010/main" val="19794660"/>
+      </p:ext>
+    </p:extLst>
+  </p:cSld>
+  <p:clrMapOvr>
+    <a:masterClrMapping/>
+  </p:clrMapOvr>
+</p:sld>
+</file>
+
+<file path=ppt/slides/slide16.xml><?xml version="1.0" encoding="utf-8"?>
+<p:sld xmlns:a="http://schemas.openxmlformats.org/drawingml/2006/main" xmlns:r="http://schemas.openxmlformats.org/officeDocument/2006/relationships" xmlns:p="http://schemas.openxmlformats.org/presentationml/2006/main">
+  <p:cSld>
+    <p:spTree>
+      <p:nvGrpSpPr>
+        <p:cNvPr id="1" name=""/>
+        <p:cNvGrpSpPr/>
+        <p:nvPr/>
+      </p:nvGrpSpPr>
+      <p:grpSpPr>
+        <a:xfrm>
+          <a:off x="0" y="0"/>
+          <a:ext cx="0" cy="0"/>
+          <a:chOff x="0" y="0"/>
+          <a:chExt cx="0" cy="0"/>
+        </a:xfrm>
+      </p:grpSpPr>
+      <p:sp>
+        <p:nvSpPr>
+          <p:cNvPr id="4" name="화살표: 오각형 3">
+            <a:extLst>
+              <a:ext uri="{FF2B5EF4-FFF2-40B4-BE49-F238E27FC236}">
+                <a16:creationId xmlns:a16="http://schemas.microsoft.com/office/drawing/2014/main" id="{B15A06DF-DFFD-4319-AE40-E07BE51C3A98}"/>
+              </a:ext>
+            </a:extLst>
+          </p:cNvPr>
+          <p:cNvSpPr/>
+          <p:nvPr/>
+        </p:nvSpPr>
+        <p:spPr>
+          <a:xfrm rot="16200000">
+            <a:off x="3584689" y="3787781"/>
+            <a:ext cx="806172" cy="1265067"/>
+          </a:xfrm>
+          <a:prstGeom prst="homePlate">
+            <a:avLst>
+              <a:gd name="adj" fmla="val 39700"/>
+            </a:avLst>
+          </a:prstGeom>
+          <a:solidFill>
+            <a:srgbClr val="E5E57F"/>
+          </a:solidFill>
+          <a:ln w="19050">
+            <a:solidFill>
+              <a:schemeClr val="tx1"/>
+            </a:solidFill>
+          </a:ln>
+        </p:spPr>
+        <p:style>
+          <a:lnRef idx="2">
+            <a:schemeClr val="accent1">
+              <a:shade val="50000"/>
+            </a:schemeClr>
+          </a:lnRef>
+          <a:fillRef idx="1">
+            <a:schemeClr val="accent1"/>
+          </a:fillRef>
+          <a:effectRef idx="0">
+            <a:schemeClr val="accent1"/>
+          </a:effectRef>
+          <a:fontRef idx="minor">
+            <a:schemeClr val="lt1"/>
+          </a:fontRef>
+        </p:style>
+        <p:txBody>
+          <a:bodyPr vert="eaVert" rtlCol="0" anchor="ctr"/>
+          <a:lstStyle/>
+          <a:p>
+            <a:pPr algn="ctr"/>
+            <a:r>
+              <a:rPr lang="en-US" altLang="ko-KR" sz="2000">
+                <a:solidFill>
+                  <a:schemeClr val="tx1"/>
+                </a:solidFill>
+                <a:latin typeface="Arial" panose="020B0604020202020204" pitchFamily="34" charset="0"/>
+                <a:cs typeface="Arial" panose="020B0604020202020204" pitchFamily="34" charset="0"/>
+              </a:rPr>
+              <a:t>Person</a:t>
+            </a:r>
+            <a:endParaRPr lang="ko-KR" altLang="en-US" sz="2000">
+              <a:solidFill>
+                <a:schemeClr val="tx1"/>
+              </a:solidFill>
+              <a:latin typeface="Arial" panose="020B0604020202020204" pitchFamily="34" charset="0"/>
+              <a:cs typeface="Arial" panose="020B0604020202020204" pitchFamily="34" charset="0"/>
+            </a:endParaRPr>
+          </a:p>
+        </p:txBody>
+      </p:sp>
+      <p:sp>
+        <p:nvSpPr>
+          <p:cNvPr id="5" name="사각형: 둥근 모서리 4">
+            <a:extLst>
+              <a:ext uri="{FF2B5EF4-FFF2-40B4-BE49-F238E27FC236}">
+                <a16:creationId xmlns:a16="http://schemas.microsoft.com/office/drawing/2014/main" id="{B4B428D1-38E3-4D33-8F92-C2F8B0E41A96}"/>
+              </a:ext>
+            </a:extLst>
+          </p:cNvPr>
+          <p:cNvSpPr/>
+          <p:nvPr/>
+        </p:nvSpPr>
+        <p:spPr>
+          <a:xfrm>
+            <a:off x="6321636" y="2574934"/>
+            <a:ext cx="1344596" cy="706624"/>
+          </a:xfrm>
+          <a:prstGeom prst="roundRect">
+            <a:avLst>
+              <a:gd name="adj" fmla="val 42223"/>
+            </a:avLst>
+          </a:prstGeom>
+          <a:solidFill>
+            <a:srgbClr val="FFF2CC"/>
+          </a:solidFill>
+          <a:ln w="19050">
+            <a:solidFill>
+              <a:schemeClr val="tx1"/>
+            </a:solidFill>
+          </a:ln>
+        </p:spPr>
+        <p:style>
+          <a:lnRef idx="2">
+            <a:schemeClr val="accent1">
+              <a:shade val="50000"/>
+            </a:schemeClr>
+          </a:lnRef>
+          <a:fillRef idx="1">
+            <a:schemeClr val="accent1"/>
+          </a:fillRef>
+          <a:effectRef idx="0">
+            <a:schemeClr val="accent1"/>
+          </a:effectRef>
+          <a:fontRef idx="minor">
+            <a:schemeClr val="lt1"/>
+          </a:fontRef>
+        </p:style>
+        <p:txBody>
+          <a:bodyPr rtlCol="0" anchor="ctr"/>
+          <a:lstStyle/>
+          <a:p>
+            <a:pPr algn="ctr"/>
+            <a:r>
+              <a:rPr lang="en-US" altLang="ko-KR" sz="2000">
+                <a:solidFill>
+                  <a:schemeClr val="tx1"/>
+                </a:solidFill>
+                <a:latin typeface="Arial" panose="020B0604020202020204" pitchFamily="34" charset="0"/>
+                <a:cs typeface="Arial" panose="020B0604020202020204" pitchFamily="34" charset="0"/>
+              </a:rPr>
+              <a:t>Data</a:t>
+            </a:r>
+            <a:endParaRPr lang="ko-KR" altLang="en-US" sz="2000">
+              <a:solidFill>
+                <a:schemeClr val="tx1"/>
+              </a:solidFill>
+              <a:latin typeface="Arial" panose="020B0604020202020204" pitchFamily="34" charset="0"/>
+              <a:cs typeface="Arial" panose="020B0604020202020204" pitchFamily="34" charset="0"/>
+            </a:endParaRPr>
+          </a:p>
+        </p:txBody>
+      </p:sp>
+      <p:sp>
+        <p:nvSpPr>
+          <p:cNvPr id="6" name="직사각형 5">
+            <a:extLst>
+              <a:ext uri="{FF2B5EF4-FFF2-40B4-BE49-F238E27FC236}">
+                <a16:creationId xmlns:a16="http://schemas.microsoft.com/office/drawing/2014/main" id="{EA2FFA64-2CF1-4540-B9DE-6A7F1ADD087B}"/>
+              </a:ext>
+            </a:extLst>
+          </p:cNvPr>
+          <p:cNvSpPr/>
+          <p:nvPr/>
+        </p:nvSpPr>
+        <p:spPr>
+          <a:xfrm>
+            <a:off x="3323107" y="2592966"/>
+            <a:ext cx="1329337" cy="670560"/>
+          </a:xfrm>
+          <a:prstGeom prst="rect">
+            <a:avLst/>
+          </a:prstGeom>
+          <a:solidFill>
+            <a:srgbClr val="CCCCFF"/>
+          </a:solidFill>
+          <a:ln w="19050">
+            <a:solidFill>
+              <a:schemeClr val="tx1"/>
+            </a:solidFill>
+          </a:ln>
+        </p:spPr>
+        <p:style>
+          <a:lnRef idx="2">
+            <a:schemeClr val="accent1">
+              <a:shade val="50000"/>
+            </a:schemeClr>
+          </a:lnRef>
+          <a:fillRef idx="1">
+            <a:schemeClr val="accent1"/>
+          </a:fillRef>
+          <a:effectRef idx="0">
+            <a:schemeClr val="accent1"/>
+          </a:effectRef>
+          <a:fontRef idx="minor">
+            <a:schemeClr val="lt1"/>
+          </a:fontRef>
+        </p:style>
+        <p:txBody>
+          <a:bodyPr rot="0" spcFirstLastPara="0" vertOverflow="overflow" horzOverflow="overflow" vert="horz" wrap="square" lIns="91440" tIns="45720" rIns="91440" bIns="45720" numCol="1" spcCol="0" rtlCol="0" fromWordArt="0" anchor="ctr" anchorCtr="0" forceAA="0" compatLnSpc="1">
+            <a:prstTxWarp prst="textNoShape">
+              <a:avLst/>
+            </a:prstTxWarp>
+            <a:noAutofit/>
+          </a:bodyPr>
+          <a:lstStyle/>
+          <a:p>
+            <a:pPr algn="ctr"/>
+            <a:r>
+              <a:rPr lang="ko-KR" altLang="en-US" sz="2000">
+                <a:solidFill>
+                  <a:schemeClr val="tx1"/>
+                </a:solidFill>
+                <a:latin typeface="Arial" panose="020B0604020202020204" pitchFamily="34" charset="0"/>
+                <a:cs typeface="Arial" panose="020B0604020202020204" pitchFamily="34" charset="0"/>
+              </a:rPr>
+              <a:t>생성</a:t>
+            </a:r>
+            <a:endParaRPr lang="ko-KR" altLang="en-US" sz="2000" dirty="0">
+              <a:solidFill>
+                <a:schemeClr val="tx1"/>
+              </a:solidFill>
+              <a:latin typeface="Arial" panose="020B0604020202020204" pitchFamily="34" charset="0"/>
+              <a:cs typeface="Arial" panose="020B0604020202020204" pitchFamily="34" charset="0"/>
+            </a:endParaRPr>
+          </a:p>
+        </p:txBody>
+      </p:sp>
+      <p:cxnSp>
+        <p:nvCxnSpPr>
+          <p:cNvPr id="8" name="직선 화살표 연결선 7">
+            <a:extLst>
+              <a:ext uri="{FF2B5EF4-FFF2-40B4-BE49-F238E27FC236}">
+                <a16:creationId xmlns:a16="http://schemas.microsoft.com/office/drawing/2014/main" id="{3DCD5011-E537-4943-8AE9-A8D80FE3D872}"/>
+              </a:ext>
+            </a:extLst>
+          </p:cNvPr>
+          <p:cNvCxnSpPr>
+            <a:cxnSpLocks/>
+            <a:stCxn id="4" idx="3"/>
+            <a:endCxn id="6" idx="2"/>
+          </p:cNvCxnSpPr>
+          <p:nvPr/>
+        </p:nvCxnSpPr>
+        <p:spPr>
+          <a:xfrm flipV="1">
+            <a:off x="3987776" y="3263526"/>
+            <a:ext cx="0" cy="753703"/>
+          </a:xfrm>
+          <a:prstGeom prst="straightConnector1">
+            <a:avLst/>
+          </a:prstGeom>
+          <a:ln w="19050">
+            <a:solidFill>
+              <a:schemeClr val="tx1"/>
+            </a:solidFill>
+            <a:headEnd type="triangle" w="lg" len="lg"/>
+            <a:tailEnd type="none"/>
+          </a:ln>
+        </p:spPr>
+        <p:style>
+          <a:lnRef idx="1">
+            <a:schemeClr val="accent1"/>
+          </a:lnRef>
+          <a:fillRef idx="0">
+            <a:schemeClr val="accent1"/>
+          </a:fillRef>
+          <a:effectRef idx="0">
+            <a:schemeClr val="accent1"/>
+          </a:effectRef>
+          <a:fontRef idx="minor">
+            <a:schemeClr val="tx1"/>
+          </a:fontRef>
+        </p:style>
+      </p:cxnSp>
+      <p:cxnSp>
+        <p:nvCxnSpPr>
+          <p:cNvPr id="9" name="직선 화살표 연결선 8">
+            <a:extLst>
+              <a:ext uri="{FF2B5EF4-FFF2-40B4-BE49-F238E27FC236}">
+                <a16:creationId xmlns:a16="http://schemas.microsoft.com/office/drawing/2014/main" id="{CE66ADBD-302D-4B82-940F-C4D611AB9A3E}"/>
+              </a:ext>
+            </a:extLst>
+          </p:cNvPr>
+          <p:cNvCxnSpPr>
+            <a:cxnSpLocks/>
+            <a:stCxn id="5" idx="1"/>
+            <a:endCxn id="6" idx="3"/>
+          </p:cNvCxnSpPr>
+          <p:nvPr/>
+        </p:nvCxnSpPr>
+        <p:spPr>
+          <a:xfrm flipH="1">
+            <a:off x="4652444" y="2928246"/>
+            <a:ext cx="1669192" cy="0"/>
+          </a:xfrm>
+          <a:prstGeom prst="straightConnector1">
+            <a:avLst/>
+          </a:prstGeom>
+          <a:ln w="19050">
+            <a:solidFill>
+              <a:schemeClr val="tx1"/>
+            </a:solidFill>
+            <a:headEnd type="none" w="lg" len="lg"/>
+            <a:tailEnd type="triangle" w="lg" len="lg"/>
+          </a:ln>
+        </p:spPr>
+        <p:style>
+          <a:lnRef idx="1">
+            <a:schemeClr val="accent1"/>
+          </a:lnRef>
+          <a:fillRef idx="0">
+            <a:schemeClr val="accent1"/>
+          </a:fillRef>
+          <a:effectRef idx="0">
+            <a:schemeClr val="accent1"/>
+          </a:effectRef>
+          <a:fontRef idx="minor">
+            <a:schemeClr val="tx1"/>
+          </a:fontRef>
+        </p:style>
+      </p:cxnSp>
+      <p:sp>
+        <p:nvSpPr>
+          <p:cNvPr id="10" name="TextBox 9">
+            <a:extLst>
+              <a:ext uri="{FF2B5EF4-FFF2-40B4-BE49-F238E27FC236}">
+                <a16:creationId xmlns:a16="http://schemas.microsoft.com/office/drawing/2014/main" id="{8719ED7C-2E5D-405E-BE76-A35E1E4D3B87}"/>
+              </a:ext>
+            </a:extLst>
+          </p:cNvPr>
+          <p:cNvSpPr txBox="1"/>
+          <p:nvPr/>
+        </p:nvSpPr>
+        <p:spPr>
+          <a:xfrm>
+            <a:off x="5029321" y="2592966"/>
+            <a:ext cx="1682088" cy="377641"/>
+          </a:xfrm>
+          <a:prstGeom prst="rect">
+            <a:avLst/>
+          </a:prstGeom>
+          <a:noFill/>
+        </p:spPr>
+        <p:txBody>
+          <a:bodyPr wrap="square" rtlCol="0">
+            <a:spAutoFit/>
+          </a:bodyPr>
+          <a:lstStyle/>
+          <a:p>
+            <a:r>
+              <a:rPr lang="en-US" altLang="ko-KR">
+                <a:latin typeface="Arial" panose="020B0604020202020204" pitchFamily="34" charset="0"/>
+                <a:cs typeface="Arial" panose="020B0604020202020204" pitchFamily="34" charset="0"/>
+              </a:rPr>
+              <a:t>Generate</a:t>
+            </a:r>
+            <a:endParaRPr lang="ko-KR" altLang="en-US">
+              <a:latin typeface="Arial" panose="020B0604020202020204" pitchFamily="34" charset="0"/>
+              <a:cs typeface="Arial" panose="020B0604020202020204" pitchFamily="34" charset="0"/>
+            </a:endParaRPr>
+          </a:p>
+        </p:txBody>
+      </p:sp>
+      <p:sp>
+        <p:nvSpPr>
+          <p:cNvPr id="12" name="TextBox 11">
+            <a:extLst>
+              <a:ext uri="{FF2B5EF4-FFF2-40B4-BE49-F238E27FC236}">
+                <a16:creationId xmlns:a16="http://schemas.microsoft.com/office/drawing/2014/main" id="{4A8E83A3-AE12-4CBB-981E-E7D0DB152B2A}"/>
+              </a:ext>
+            </a:extLst>
+          </p:cNvPr>
+          <p:cNvSpPr txBox="1"/>
+          <p:nvPr/>
+        </p:nvSpPr>
+        <p:spPr>
+          <a:xfrm>
+            <a:off x="3987775" y="3455711"/>
+            <a:ext cx="2757869" cy="369332"/>
+          </a:xfrm>
+          <a:prstGeom prst="rect">
+            <a:avLst/>
+          </a:prstGeom>
+          <a:noFill/>
+        </p:spPr>
+        <p:txBody>
+          <a:bodyPr wrap="square" rtlCol="0">
+            <a:spAutoFit/>
+          </a:bodyPr>
+          <a:lstStyle/>
+          <a:p>
+            <a:r>
+              <a:rPr lang="en-US" altLang="ko-KR">
+                <a:latin typeface="Arial" panose="020B0604020202020204" pitchFamily="34" charset="0"/>
+                <a:cs typeface="Arial" panose="020B0604020202020204" pitchFamily="34" charset="0"/>
+              </a:rPr>
+              <a:t>Act</a:t>
+            </a:r>
+            <a:endParaRPr lang="ko-KR" altLang="en-US">
+              <a:latin typeface="Arial" panose="020B0604020202020204" pitchFamily="34" charset="0"/>
+              <a:cs typeface="Arial" panose="020B0604020202020204" pitchFamily="34" charset="0"/>
+            </a:endParaRPr>
+          </a:p>
+        </p:txBody>
+      </p:sp>
+    </p:spTree>
+    <p:extLst>
+      <p:ext uri="{BB962C8B-B14F-4D97-AF65-F5344CB8AC3E}">
+        <p14:creationId xmlns:p14="http://schemas.microsoft.com/office/powerpoint/2010/main" val="2456710672"/>
+      </p:ext>
+    </p:extLst>
+  </p:cSld>
+  <p:clrMapOvr>
+    <a:masterClrMapping/>
+  </p:clrMapOvr>
+</p:sld>
+</file>
+
+<file path=ppt/slides/slide17.xml><?xml version="1.0" encoding="utf-8"?>
+<p:sld xmlns:a="http://schemas.openxmlformats.org/drawingml/2006/main" xmlns:r="http://schemas.openxmlformats.org/officeDocument/2006/relationships" xmlns:p="http://schemas.openxmlformats.org/presentationml/2006/main">
+  <p:cSld>
+    <p:spTree>
+      <p:nvGrpSpPr>
+        <p:cNvPr id="1" name=""/>
+        <p:cNvGrpSpPr/>
+        <p:nvPr/>
+      </p:nvGrpSpPr>
+      <p:grpSpPr>
+        <a:xfrm>
+          <a:off x="0" y="0"/>
+          <a:ext cx="0" cy="0"/>
+          <a:chOff x="0" y="0"/>
+          <a:chExt cx="0" cy="0"/>
+        </a:xfrm>
+      </p:grpSpPr>
+      <p:sp>
+        <p:nvSpPr>
+          <p:cNvPr id="4" name="화살표: 오각형 3">
+            <a:extLst>
+              <a:ext uri="{FF2B5EF4-FFF2-40B4-BE49-F238E27FC236}">
+                <a16:creationId xmlns:a16="http://schemas.microsoft.com/office/drawing/2014/main" id="{B15A06DF-DFFD-4319-AE40-E07BE51C3A98}"/>
+              </a:ext>
+            </a:extLst>
+          </p:cNvPr>
+          <p:cNvSpPr/>
+          <p:nvPr/>
+        </p:nvSpPr>
+        <p:spPr>
+          <a:xfrm rot="16200000">
+            <a:off x="5366836" y="3761070"/>
+            <a:ext cx="806172" cy="1265067"/>
+          </a:xfrm>
+          <a:prstGeom prst="homePlate">
+            <a:avLst>
+              <a:gd name="adj" fmla="val 39700"/>
+            </a:avLst>
+          </a:prstGeom>
+          <a:solidFill>
+            <a:srgbClr val="E5E57F"/>
+          </a:solidFill>
+          <a:ln w="19050">
+            <a:solidFill>
+              <a:schemeClr val="tx1"/>
+            </a:solidFill>
+          </a:ln>
+        </p:spPr>
+        <p:style>
+          <a:lnRef idx="2">
+            <a:schemeClr val="accent1">
+              <a:shade val="50000"/>
+            </a:schemeClr>
+          </a:lnRef>
+          <a:fillRef idx="1">
+            <a:schemeClr val="accent1"/>
+          </a:fillRef>
+          <a:effectRef idx="0">
+            <a:schemeClr val="accent1"/>
+          </a:effectRef>
+          <a:fontRef idx="minor">
+            <a:schemeClr val="lt1"/>
+          </a:fontRef>
+        </p:style>
+        <p:txBody>
+          <a:bodyPr vert="eaVert" rtlCol="0" anchor="ctr"/>
+          <a:lstStyle/>
+          <a:p>
+            <a:pPr algn="ctr"/>
+            <a:r>
+              <a:rPr lang="en-US" altLang="ko-KR" sz="2000">
+                <a:solidFill>
+                  <a:schemeClr val="tx1"/>
+                </a:solidFill>
+                <a:latin typeface="Arial" panose="020B0604020202020204" pitchFamily="34" charset="0"/>
+                <a:cs typeface="Arial" panose="020B0604020202020204" pitchFamily="34" charset="0"/>
+              </a:rPr>
+              <a:t>Person</a:t>
+            </a:r>
+            <a:endParaRPr lang="ko-KR" altLang="en-US" sz="2000">
+              <a:solidFill>
+                <a:schemeClr val="tx1"/>
+              </a:solidFill>
+              <a:latin typeface="Arial" panose="020B0604020202020204" pitchFamily="34" charset="0"/>
+              <a:cs typeface="Arial" panose="020B0604020202020204" pitchFamily="34" charset="0"/>
+            </a:endParaRPr>
+          </a:p>
+        </p:txBody>
+      </p:sp>
+      <p:sp>
+        <p:nvSpPr>
+          <p:cNvPr id="5" name="사각형: 둥근 모서리 4">
+            <a:extLst>
+              <a:ext uri="{FF2B5EF4-FFF2-40B4-BE49-F238E27FC236}">
+                <a16:creationId xmlns:a16="http://schemas.microsoft.com/office/drawing/2014/main" id="{B4B428D1-38E3-4D33-8F92-C2F8B0E41A96}"/>
+              </a:ext>
+            </a:extLst>
+          </p:cNvPr>
+          <p:cNvSpPr/>
+          <p:nvPr/>
+        </p:nvSpPr>
+        <p:spPr>
+          <a:xfrm>
+            <a:off x="8103783" y="2548223"/>
+            <a:ext cx="1344596" cy="706624"/>
+          </a:xfrm>
+          <a:prstGeom prst="roundRect">
+            <a:avLst>
+              <a:gd name="adj" fmla="val 42223"/>
+            </a:avLst>
+          </a:prstGeom>
+          <a:solidFill>
+            <a:srgbClr val="FFF2CC"/>
+          </a:solidFill>
+          <a:ln w="19050">
+            <a:solidFill>
+              <a:schemeClr val="tx1"/>
+            </a:solidFill>
+          </a:ln>
+        </p:spPr>
+        <p:style>
+          <a:lnRef idx="2">
+            <a:schemeClr val="accent1">
+              <a:shade val="50000"/>
+            </a:schemeClr>
+          </a:lnRef>
+          <a:fillRef idx="1">
+            <a:schemeClr val="accent1"/>
+          </a:fillRef>
+          <a:effectRef idx="0">
+            <a:schemeClr val="accent1"/>
+          </a:effectRef>
+          <a:fontRef idx="minor">
+            <a:schemeClr val="lt1"/>
+          </a:fontRef>
+        </p:style>
+        <p:txBody>
+          <a:bodyPr rtlCol="0" anchor="ctr"/>
+          <a:lstStyle/>
+          <a:p>
+            <a:pPr algn="ctr"/>
+            <a:r>
+              <a:rPr lang="en-US" altLang="ko-KR" sz="2000">
+                <a:solidFill>
+                  <a:schemeClr val="tx1"/>
+                </a:solidFill>
+                <a:latin typeface="Arial" panose="020B0604020202020204" pitchFamily="34" charset="0"/>
+                <a:cs typeface="Arial" panose="020B0604020202020204" pitchFamily="34" charset="0"/>
+              </a:rPr>
+              <a:t>Data2</a:t>
+            </a:r>
+            <a:endParaRPr lang="ko-KR" altLang="en-US" sz="2000">
+              <a:solidFill>
+                <a:schemeClr val="tx1"/>
+              </a:solidFill>
+              <a:latin typeface="Arial" panose="020B0604020202020204" pitchFamily="34" charset="0"/>
+              <a:cs typeface="Arial" panose="020B0604020202020204" pitchFamily="34" charset="0"/>
+            </a:endParaRPr>
+          </a:p>
+        </p:txBody>
+      </p:sp>
+      <p:sp>
+        <p:nvSpPr>
+          <p:cNvPr id="6" name="직사각형 5">
+            <a:extLst>
+              <a:ext uri="{FF2B5EF4-FFF2-40B4-BE49-F238E27FC236}">
+                <a16:creationId xmlns:a16="http://schemas.microsoft.com/office/drawing/2014/main" id="{EA2FFA64-2CF1-4540-B9DE-6A7F1ADD087B}"/>
+              </a:ext>
+            </a:extLst>
+          </p:cNvPr>
+          <p:cNvSpPr/>
+          <p:nvPr/>
+        </p:nvSpPr>
+        <p:spPr>
+          <a:xfrm>
+            <a:off x="5105254" y="2566255"/>
+            <a:ext cx="1329337" cy="670560"/>
+          </a:xfrm>
+          <a:prstGeom prst="rect">
+            <a:avLst/>
+          </a:prstGeom>
+          <a:solidFill>
+            <a:srgbClr val="CCCCFF"/>
+          </a:solidFill>
+          <a:ln w="19050">
+            <a:solidFill>
+              <a:schemeClr val="tx1"/>
+            </a:solidFill>
+          </a:ln>
+        </p:spPr>
+        <p:style>
+          <a:lnRef idx="2">
+            <a:schemeClr val="accent1">
+              <a:shade val="50000"/>
+            </a:schemeClr>
+          </a:lnRef>
+          <a:fillRef idx="1">
+            <a:schemeClr val="accent1"/>
+          </a:fillRef>
+          <a:effectRef idx="0">
+            <a:schemeClr val="accent1"/>
+          </a:effectRef>
+          <a:fontRef idx="minor">
+            <a:schemeClr val="lt1"/>
+          </a:fontRef>
+        </p:style>
+        <p:txBody>
+          <a:bodyPr rot="0" spcFirstLastPara="0" vertOverflow="overflow" horzOverflow="overflow" vert="horz" wrap="square" lIns="91440" tIns="45720" rIns="91440" bIns="45720" numCol="1" spcCol="0" rtlCol="0" fromWordArt="0" anchor="ctr" anchorCtr="0" forceAA="0" compatLnSpc="1">
+            <a:prstTxWarp prst="textNoShape">
+              <a:avLst/>
+            </a:prstTxWarp>
+            <a:noAutofit/>
+          </a:bodyPr>
+          <a:lstStyle/>
+          <a:p>
+            <a:pPr algn="ctr"/>
+            <a:r>
+              <a:rPr lang="ko-KR" altLang="en-US" sz="2000">
+                <a:solidFill>
+                  <a:schemeClr val="tx1"/>
+                </a:solidFill>
+                <a:latin typeface="Arial" panose="020B0604020202020204" pitchFamily="34" charset="0"/>
+                <a:cs typeface="Arial" panose="020B0604020202020204" pitchFamily="34" charset="0"/>
+              </a:rPr>
+              <a:t>가공</a:t>
+            </a:r>
+            <a:r>
+              <a:rPr lang="en-US" altLang="ko-KR" sz="2000">
+                <a:solidFill>
+                  <a:schemeClr val="tx1"/>
+                </a:solidFill>
+                <a:latin typeface="Arial" panose="020B0604020202020204" pitchFamily="34" charset="0"/>
+                <a:cs typeface="Arial" panose="020B0604020202020204" pitchFamily="34" charset="0"/>
+              </a:rPr>
+              <a:t>/</a:t>
+            </a:r>
+            <a:r>
+              <a:rPr lang="ko-KR" altLang="en-US" sz="2000">
+                <a:solidFill>
+                  <a:schemeClr val="tx1"/>
+                </a:solidFill>
+                <a:latin typeface="Arial" panose="020B0604020202020204" pitchFamily="34" charset="0"/>
+                <a:cs typeface="Arial" panose="020B0604020202020204" pitchFamily="34" charset="0"/>
+              </a:rPr>
+              <a:t>변환</a:t>
+            </a:r>
+            <a:endParaRPr lang="ko-KR" altLang="en-US" sz="2000" dirty="0">
+              <a:solidFill>
+                <a:schemeClr val="tx1"/>
+              </a:solidFill>
+              <a:latin typeface="Arial" panose="020B0604020202020204" pitchFamily="34" charset="0"/>
+              <a:cs typeface="Arial" panose="020B0604020202020204" pitchFamily="34" charset="0"/>
+            </a:endParaRPr>
+          </a:p>
+        </p:txBody>
+      </p:sp>
+      <p:cxnSp>
+        <p:nvCxnSpPr>
+          <p:cNvPr id="8" name="직선 화살표 연결선 7">
+            <a:extLst>
+              <a:ext uri="{FF2B5EF4-FFF2-40B4-BE49-F238E27FC236}">
+                <a16:creationId xmlns:a16="http://schemas.microsoft.com/office/drawing/2014/main" id="{3DCD5011-E537-4943-8AE9-A8D80FE3D872}"/>
+              </a:ext>
+            </a:extLst>
+          </p:cNvPr>
+          <p:cNvCxnSpPr>
+            <a:cxnSpLocks/>
+            <a:stCxn id="4" idx="3"/>
+            <a:endCxn id="6" idx="2"/>
+          </p:cNvCxnSpPr>
+          <p:nvPr/>
+        </p:nvCxnSpPr>
+        <p:spPr>
+          <a:xfrm flipV="1">
+            <a:off x="5769923" y="3236815"/>
+            <a:ext cx="0" cy="753703"/>
+          </a:xfrm>
+          <a:prstGeom prst="straightConnector1">
+            <a:avLst/>
+          </a:prstGeom>
+          <a:ln w="19050">
+            <a:solidFill>
+              <a:schemeClr val="tx1"/>
+            </a:solidFill>
+            <a:headEnd type="triangle" w="lg" len="lg"/>
+            <a:tailEnd type="none"/>
+          </a:ln>
+        </p:spPr>
+        <p:style>
+          <a:lnRef idx="1">
+            <a:schemeClr val="accent1"/>
+          </a:lnRef>
+          <a:fillRef idx="0">
+            <a:schemeClr val="accent1"/>
+          </a:fillRef>
+          <a:effectRef idx="0">
+            <a:schemeClr val="accent1"/>
+          </a:effectRef>
+          <a:fontRef idx="minor">
+            <a:schemeClr val="tx1"/>
+          </a:fontRef>
+        </p:style>
+      </p:cxnSp>
+      <p:cxnSp>
+        <p:nvCxnSpPr>
+          <p:cNvPr id="9" name="직선 화살표 연결선 8">
+            <a:extLst>
+              <a:ext uri="{FF2B5EF4-FFF2-40B4-BE49-F238E27FC236}">
+                <a16:creationId xmlns:a16="http://schemas.microsoft.com/office/drawing/2014/main" id="{CE66ADBD-302D-4B82-940F-C4D611AB9A3E}"/>
+              </a:ext>
+            </a:extLst>
+          </p:cNvPr>
+          <p:cNvCxnSpPr>
+            <a:cxnSpLocks/>
+            <a:stCxn id="5" idx="1"/>
+            <a:endCxn id="6" idx="3"/>
+          </p:cNvCxnSpPr>
+          <p:nvPr/>
+        </p:nvCxnSpPr>
+        <p:spPr>
+          <a:xfrm flipH="1">
+            <a:off x="6434591" y="2901535"/>
+            <a:ext cx="1669192" cy="0"/>
+          </a:xfrm>
+          <a:prstGeom prst="straightConnector1">
+            <a:avLst/>
+          </a:prstGeom>
+          <a:ln w="19050">
+            <a:solidFill>
+              <a:schemeClr val="tx1"/>
+            </a:solidFill>
+            <a:headEnd type="none" w="lg" len="lg"/>
+            <a:tailEnd type="triangle" w="lg" len="lg"/>
+          </a:ln>
+        </p:spPr>
+        <p:style>
+          <a:lnRef idx="1">
+            <a:schemeClr val="accent1"/>
+          </a:lnRef>
+          <a:fillRef idx="0">
+            <a:schemeClr val="accent1"/>
+          </a:fillRef>
+          <a:effectRef idx="0">
+            <a:schemeClr val="accent1"/>
+          </a:effectRef>
+          <a:fontRef idx="minor">
+            <a:schemeClr val="tx1"/>
+          </a:fontRef>
+        </p:style>
+      </p:cxnSp>
+      <p:sp>
+        <p:nvSpPr>
+          <p:cNvPr id="10" name="TextBox 9">
+            <a:extLst>
+              <a:ext uri="{FF2B5EF4-FFF2-40B4-BE49-F238E27FC236}">
+                <a16:creationId xmlns:a16="http://schemas.microsoft.com/office/drawing/2014/main" id="{8719ED7C-2E5D-405E-BE76-A35E1E4D3B87}"/>
+              </a:ext>
+            </a:extLst>
+          </p:cNvPr>
+          <p:cNvSpPr txBox="1"/>
+          <p:nvPr/>
+        </p:nvSpPr>
+        <p:spPr>
+          <a:xfrm>
+            <a:off x="6811468" y="2566255"/>
+            <a:ext cx="1682088" cy="377641"/>
+          </a:xfrm>
+          <a:prstGeom prst="rect">
+            <a:avLst/>
+          </a:prstGeom>
+          <a:noFill/>
+        </p:spPr>
+        <p:txBody>
+          <a:bodyPr wrap="square" rtlCol="0">
+            <a:spAutoFit/>
+          </a:bodyPr>
+          <a:lstStyle/>
+          <a:p>
+            <a:r>
+              <a:rPr lang="en-US" altLang="ko-KR">
+                <a:latin typeface="Arial" panose="020B0604020202020204" pitchFamily="34" charset="0"/>
+                <a:cs typeface="Arial" panose="020B0604020202020204" pitchFamily="34" charset="0"/>
+              </a:rPr>
+              <a:t>Generate</a:t>
+            </a:r>
+            <a:endParaRPr lang="ko-KR" altLang="en-US">
+              <a:latin typeface="Arial" panose="020B0604020202020204" pitchFamily="34" charset="0"/>
+              <a:cs typeface="Arial" panose="020B0604020202020204" pitchFamily="34" charset="0"/>
+            </a:endParaRPr>
+          </a:p>
+        </p:txBody>
+      </p:sp>
+      <p:sp>
+        <p:nvSpPr>
+          <p:cNvPr id="12" name="TextBox 11">
+            <a:extLst>
+              <a:ext uri="{FF2B5EF4-FFF2-40B4-BE49-F238E27FC236}">
+                <a16:creationId xmlns:a16="http://schemas.microsoft.com/office/drawing/2014/main" id="{4A8E83A3-AE12-4CBB-981E-E7D0DB152B2A}"/>
+              </a:ext>
+            </a:extLst>
+          </p:cNvPr>
+          <p:cNvSpPr txBox="1"/>
+          <p:nvPr/>
+        </p:nvSpPr>
+        <p:spPr>
+          <a:xfrm>
+            <a:off x="5769922" y="3429000"/>
+            <a:ext cx="2757869" cy="369332"/>
+          </a:xfrm>
+          <a:prstGeom prst="rect">
+            <a:avLst/>
+          </a:prstGeom>
+          <a:noFill/>
+        </p:spPr>
+        <p:txBody>
+          <a:bodyPr wrap="square" rtlCol="0">
+            <a:spAutoFit/>
+          </a:bodyPr>
+          <a:lstStyle/>
+          <a:p>
+            <a:r>
+              <a:rPr lang="en-US" altLang="ko-KR">
+                <a:latin typeface="Arial" panose="020B0604020202020204" pitchFamily="34" charset="0"/>
+                <a:cs typeface="Arial" panose="020B0604020202020204" pitchFamily="34" charset="0"/>
+              </a:rPr>
+              <a:t>Act</a:t>
+            </a:r>
+            <a:endParaRPr lang="ko-KR" altLang="en-US">
+              <a:latin typeface="Arial" panose="020B0604020202020204" pitchFamily="34" charset="0"/>
+              <a:cs typeface="Arial" panose="020B0604020202020204" pitchFamily="34" charset="0"/>
+            </a:endParaRPr>
+          </a:p>
+        </p:txBody>
+      </p:sp>
+      <p:cxnSp>
+        <p:nvCxnSpPr>
+          <p:cNvPr id="11" name="직선 화살표 연결선 10">
+            <a:extLst>
+              <a:ext uri="{FF2B5EF4-FFF2-40B4-BE49-F238E27FC236}">
+                <a16:creationId xmlns:a16="http://schemas.microsoft.com/office/drawing/2014/main" id="{9F8A394D-5119-43B8-84FB-7B867A17B103}"/>
+              </a:ext>
+            </a:extLst>
+          </p:cNvPr>
+          <p:cNvCxnSpPr>
+            <a:cxnSpLocks/>
+            <a:endCxn id="14" idx="3"/>
+          </p:cNvCxnSpPr>
+          <p:nvPr/>
+        </p:nvCxnSpPr>
+        <p:spPr>
+          <a:xfrm flipH="1">
+            <a:off x="3420803" y="2898781"/>
+            <a:ext cx="1669192" cy="0"/>
+          </a:xfrm>
+          <a:prstGeom prst="straightConnector1">
+            <a:avLst/>
+          </a:prstGeom>
+          <a:ln w="19050">
+            <a:solidFill>
+              <a:schemeClr val="tx1"/>
+            </a:solidFill>
+            <a:headEnd type="none" w="lg" len="lg"/>
+            <a:tailEnd type="triangle" w="lg" len="lg"/>
+          </a:ln>
+        </p:spPr>
+        <p:style>
+          <a:lnRef idx="1">
+            <a:schemeClr val="accent1"/>
+          </a:lnRef>
+          <a:fillRef idx="0">
+            <a:schemeClr val="accent1"/>
+          </a:fillRef>
+          <a:effectRef idx="0">
+            <a:schemeClr val="accent1"/>
+          </a:effectRef>
+          <a:fontRef idx="minor">
+            <a:schemeClr val="tx1"/>
+          </a:fontRef>
+        </p:style>
+      </p:cxnSp>
+      <p:sp>
+        <p:nvSpPr>
+          <p:cNvPr id="13" name="TextBox 12">
+            <a:extLst>
+              <a:ext uri="{FF2B5EF4-FFF2-40B4-BE49-F238E27FC236}">
+                <a16:creationId xmlns:a16="http://schemas.microsoft.com/office/drawing/2014/main" id="{0125AF9E-5BAF-4D60-A2F0-B1C44E536CCE}"/>
+              </a:ext>
+            </a:extLst>
+          </p:cNvPr>
+          <p:cNvSpPr txBox="1"/>
+          <p:nvPr/>
+        </p:nvSpPr>
+        <p:spPr>
+          <a:xfrm>
+            <a:off x="3760356" y="2567228"/>
+            <a:ext cx="1682088" cy="377641"/>
+          </a:xfrm>
+          <a:prstGeom prst="rect">
+            <a:avLst/>
+          </a:prstGeom>
+          <a:noFill/>
+        </p:spPr>
+        <p:txBody>
+          <a:bodyPr wrap="square" rtlCol="0">
+            <a:spAutoFit/>
+          </a:bodyPr>
+          <a:lstStyle/>
+          <a:p>
+            <a:r>
+              <a:rPr lang="en-US" altLang="ko-KR">
+                <a:latin typeface="Arial" panose="020B0604020202020204" pitchFamily="34" charset="0"/>
+                <a:cs typeface="Arial" panose="020B0604020202020204" pitchFamily="34" charset="0"/>
+              </a:rPr>
+              <a:t>Generate</a:t>
+            </a:r>
+            <a:endParaRPr lang="ko-KR" altLang="en-US">
+              <a:latin typeface="Arial" panose="020B0604020202020204" pitchFamily="34" charset="0"/>
+              <a:cs typeface="Arial" panose="020B0604020202020204" pitchFamily="34" charset="0"/>
+            </a:endParaRPr>
+          </a:p>
+        </p:txBody>
+      </p:sp>
+      <p:sp>
+        <p:nvSpPr>
+          <p:cNvPr id="14" name="사각형: 둥근 모서리 13">
+            <a:extLst>
+              <a:ext uri="{FF2B5EF4-FFF2-40B4-BE49-F238E27FC236}">
+                <a16:creationId xmlns:a16="http://schemas.microsoft.com/office/drawing/2014/main" id="{ACD82F50-442F-4D64-82E5-8502360E350C}"/>
+              </a:ext>
+            </a:extLst>
+          </p:cNvPr>
+          <p:cNvSpPr/>
+          <p:nvPr/>
+        </p:nvSpPr>
+        <p:spPr>
+          <a:xfrm>
+            <a:off x="2076207" y="2545469"/>
+            <a:ext cx="1344596" cy="706624"/>
+          </a:xfrm>
+          <a:prstGeom prst="roundRect">
+            <a:avLst>
+              <a:gd name="adj" fmla="val 42223"/>
+            </a:avLst>
+          </a:prstGeom>
+          <a:solidFill>
+            <a:srgbClr val="FFF2CC"/>
+          </a:solidFill>
+          <a:ln w="19050">
+            <a:solidFill>
+              <a:schemeClr val="tx1"/>
+            </a:solidFill>
+          </a:ln>
+        </p:spPr>
+        <p:style>
+          <a:lnRef idx="2">
+            <a:schemeClr val="accent1">
+              <a:shade val="50000"/>
+            </a:schemeClr>
+          </a:lnRef>
+          <a:fillRef idx="1">
+            <a:schemeClr val="accent1"/>
+          </a:fillRef>
+          <a:effectRef idx="0">
+            <a:schemeClr val="accent1"/>
+          </a:effectRef>
+          <a:fontRef idx="minor">
+            <a:schemeClr val="lt1"/>
+          </a:fontRef>
+        </p:style>
+        <p:txBody>
+          <a:bodyPr rtlCol="0" anchor="ctr"/>
+          <a:lstStyle/>
+          <a:p>
+            <a:pPr algn="ctr"/>
+            <a:r>
+              <a:rPr lang="en-US" altLang="ko-KR" sz="2000">
+                <a:solidFill>
+                  <a:schemeClr val="tx1"/>
+                </a:solidFill>
+                <a:latin typeface="Arial" panose="020B0604020202020204" pitchFamily="34" charset="0"/>
+                <a:cs typeface="Arial" panose="020B0604020202020204" pitchFamily="34" charset="0"/>
+              </a:rPr>
+              <a:t>Data1</a:t>
+            </a:r>
+            <a:endParaRPr lang="ko-KR" altLang="en-US" sz="2000">
+              <a:solidFill>
+                <a:schemeClr val="tx1"/>
+              </a:solidFill>
+              <a:latin typeface="Arial" panose="020B0604020202020204" pitchFamily="34" charset="0"/>
+              <a:cs typeface="Arial" panose="020B0604020202020204" pitchFamily="34" charset="0"/>
+            </a:endParaRPr>
+          </a:p>
+        </p:txBody>
+      </p:sp>
+    </p:spTree>
+    <p:extLst>
+      <p:ext uri="{BB962C8B-B14F-4D97-AF65-F5344CB8AC3E}">
+        <p14:creationId xmlns:p14="http://schemas.microsoft.com/office/powerpoint/2010/main" val="388848676"/>
+      </p:ext>
+    </p:extLst>
+  </p:cSld>
+  <p:clrMapOvr>
+    <a:masterClrMapping/>
+  </p:clrMapOvr>
+</p:sld>
+</file>
+
+<file path=ppt/slides/slide18.xml><?xml version="1.0" encoding="utf-8"?>
+<p:sld xmlns:a="http://schemas.openxmlformats.org/drawingml/2006/main" xmlns:r="http://schemas.openxmlformats.org/officeDocument/2006/relationships" xmlns:p="http://schemas.openxmlformats.org/presentationml/2006/main">
+  <p:cSld>
+    <p:spTree>
+      <p:nvGrpSpPr>
+        <p:cNvPr id="1" name=""/>
+        <p:cNvGrpSpPr/>
+        <p:nvPr/>
+      </p:nvGrpSpPr>
+      <p:grpSpPr>
+        <a:xfrm>
+          <a:off x="0" y="0"/>
+          <a:ext cx="0" cy="0"/>
+          <a:chOff x="0" y="0"/>
+          <a:chExt cx="0" cy="0"/>
+        </a:xfrm>
+      </p:grpSpPr>
+      <p:sp>
+        <p:nvSpPr>
+          <p:cNvPr id="4" name="화살표: 오각형 3">
+            <a:extLst>
+              <a:ext uri="{FF2B5EF4-FFF2-40B4-BE49-F238E27FC236}">
+                <a16:creationId xmlns:a16="http://schemas.microsoft.com/office/drawing/2014/main" id="{B15A06DF-DFFD-4319-AE40-E07BE51C3A98}"/>
+              </a:ext>
+            </a:extLst>
+          </p:cNvPr>
+          <p:cNvSpPr/>
+          <p:nvPr/>
+        </p:nvSpPr>
+        <p:spPr>
+          <a:xfrm rot="16200000">
+            <a:off x="4446233" y="3773232"/>
+            <a:ext cx="806172" cy="1265067"/>
+          </a:xfrm>
+          <a:prstGeom prst="homePlate">
+            <a:avLst>
+              <a:gd name="adj" fmla="val 39700"/>
+            </a:avLst>
+          </a:prstGeom>
+          <a:solidFill>
+            <a:srgbClr val="E5E57F"/>
+          </a:solidFill>
+          <a:ln w="19050">
+            <a:solidFill>
+              <a:schemeClr val="tx1"/>
+            </a:solidFill>
+          </a:ln>
+        </p:spPr>
+        <p:style>
+          <a:lnRef idx="2">
+            <a:schemeClr val="accent1">
+              <a:shade val="50000"/>
+            </a:schemeClr>
+          </a:lnRef>
+          <a:fillRef idx="1">
+            <a:schemeClr val="accent1"/>
+          </a:fillRef>
+          <a:effectRef idx="0">
+            <a:schemeClr val="accent1"/>
+          </a:effectRef>
+          <a:fontRef idx="minor">
+            <a:schemeClr val="lt1"/>
+          </a:fontRef>
+        </p:style>
+        <p:txBody>
+          <a:bodyPr vert="eaVert" rtlCol="0" anchor="ctr"/>
+          <a:lstStyle/>
+          <a:p>
+            <a:pPr algn="ctr"/>
+            <a:r>
+              <a:rPr lang="en-US" altLang="ko-KR" sz="2000">
+                <a:solidFill>
+                  <a:schemeClr val="tx1"/>
+                </a:solidFill>
+                <a:latin typeface="Arial" panose="020B0604020202020204" pitchFamily="34" charset="0"/>
+                <a:cs typeface="Arial" panose="020B0604020202020204" pitchFamily="34" charset="0"/>
+              </a:rPr>
+              <a:t>Person1</a:t>
+            </a:r>
+            <a:endParaRPr lang="ko-KR" altLang="en-US" sz="2000">
+              <a:solidFill>
+                <a:schemeClr val="tx1"/>
+              </a:solidFill>
+              <a:latin typeface="Arial" panose="020B0604020202020204" pitchFamily="34" charset="0"/>
+              <a:cs typeface="Arial" panose="020B0604020202020204" pitchFamily="34" charset="0"/>
+            </a:endParaRPr>
+          </a:p>
+        </p:txBody>
+      </p:sp>
+      <p:sp>
+        <p:nvSpPr>
+          <p:cNvPr id="5" name="사각형: 둥근 모서리 4">
+            <a:extLst>
+              <a:ext uri="{FF2B5EF4-FFF2-40B4-BE49-F238E27FC236}">
+                <a16:creationId xmlns:a16="http://schemas.microsoft.com/office/drawing/2014/main" id="{B4B428D1-38E3-4D33-8F92-C2F8B0E41A96}"/>
+              </a:ext>
+            </a:extLst>
+          </p:cNvPr>
+          <p:cNvSpPr/>
+          <p:nvPr/>
+        </p:nvSpPr>
+        <p:spPr>
+          <a:xfrm>
+            <a:off x="8103783" y="2548223"/>
+            <a:ext cx="1344596" cy="706624"/>
+          </a:xfrm>
+          <a:prstGeom prst="roundRect">
+            <a:avLst>
+              <a:gd name="adj" fmla="val 42223"/>
+            </a:avLst>
+          </a:prstGeom>
+          <a:solidFill>
+            <a:srgbClr val="FFF2CC"/>
+          </a:solidFill>
+          <a:ln w="19050">
+            <a:solidFill>
+              <a:schemeClr val="tx1"/>
+            </a:solidFill>
+          </a:ln>
+        </p:spPr>
+        <p:style>
+          <a:lnRef idx="2">
+            <a:schemeClr val="accent1">
+              <a:shade val="50000"/>
+            </a:schemeClr>
+          </a:lnRef>
+          <a:fillRef idx="1">
+            <a:schemeClr val="accent1"/>
+          </a:fillRef>
+          <a:effectRef idx="0">
+            <a:schemeClr val="accent1"/>
+          </a:effectRef>
+          <a:fontRef idx="minor">
+            <a:schemeClr val="lt1"/>
+          </a:fontRef>
+        </p:style>
+        <p:txBody>
+          <a:bodyPr rtlCol="0" anchor="ctr"/>
+          <a:lstStyle/>
+          <a:p>
+            <a:pPr algn="ctr"/>
+            <a:r>
+              <a:rPr lang="en-US" altLang="ko-KR" sz="2000">
+                <a:solidFill>
+                  <a:schemeClr val="tx1"/>
+                </a:solidFill>
+                <a:latin typeface="Arial" panose="020B0604020202020204" pitchFamily="34" charset="0"/>
+                <a:cs typeface="Arial" panose="020B0604020202020204" pitchFamily="34" charset="0"/>
+              </a:rPr>
+              <a:t>Data1</a:t>
+            </a:r>
+            <a:endParaRPr lang="ko-KR" altLang="en-US" sz="2000">
+              <a:solidFill>
+                <a:schemeClr val="tx1"/>
+              </a:solidFill>
+              <a:latin typeface="Arial" panose="020B0604020202020204" pitchFamily="34" charset="0"/>
+              <a:cs typeface="Arial" panose="020B0604020202020204" pitchFamily="34" charset="0"/>
+            </a:endParaRPr>
+          </a:p>
+        </p:txBody>
+      </p:sp>
+      <p:sp>
+        <p:nvSpPr>
+          <p:cNvPr id="6" name="직사각형 5">
+            <a:extLst>
+              <a:ext uri="{FF2B5EF4-FFF2-40B4-BE49-F238E27FC236}">
+                <a16:creationId xmlns:a16="http://schemas.microsoft.com/office/drawing/2014/main" id="{EA2FFA64-2CF1-4540-B9DE-6A7F1ADD087B}"/>
+              </a:ext>
+            </a:extLst>
+          </p:cNvPr>
+          <p:cNvSpPr/>
+          <p:nvPr/>
+        </p:nvSpPr>
+        <p:spPr>
+          <a:xfrm>
+            <a:off x="5105254" y="2566255"/>
+            <a:ext cx="1329337" cy="670560"/>
+          </a:xfrm>
+          <a:prstGeom prst="rect">
+            <a:avLst/>
+          </a:prstGeom>
+          <a:solidFill>
+            <a:srgbClr val="CCCCFF"/>
+          </a:solidFill>
+          <a:ln w="19050">
+            <a:solidFill>
+              <a:schemeClr val="tx1"/>
+            </a:solidFill>
+          </a:ln>
+        </p:spPr>
+        <p:style>
+          <a:lnRef idx="2">
+            <a:schemeClr val="accent1">
+              <a:shade val="50000"/>
+            </a:schemeClr>
+          </a:lnRef>
+          <a:fillRef idx="1">
+            <a:schemeClr val="accent1"/>
+          </a:fillRef>
+          <a:effectRef idx="0">
+            <a:schemeClr val="accent1"/>
+          </a:effectRef>
+          <a:fontRef idx="minor">
+            <a:schemeClr val="lt1"/>
+          </a:fontRef>
+        </p:style>
+        <p:txBody>
+          <a:bodyPr rot="0" spcFirstLastPara="0" vertOverflow="overflow" horzOverflow="overflow" vert="horz" wrap="square" lIns="91440" tIns="45720" rIns="91440" bIns="45720" numCol="1" spcCol="0" rtlCol="0" fromWordArt="0" anchor="ctr" anchorCtr="0" forceAA="0" compatLnSpc="1">
+            <a:prstTxWarp prst="textNoShape">
+              <a:avLst/>
+            </a:prstTxWarp>
+            <a:noAutofit/>
+          </a:bodyPr>
+          <a:lstStyle/>
+          <a:p>
+            <a:pPr algn="ctr"/>
+            <a:r>
+              <a:rPr lang="ko-KR" altLang="en-US" sz="2000">
+                <a:solidFill>
+                  <a:schemeClr val="tx1"/>
+                </a:solidFill>
+                <a:latin typeface="Arial" panose="020B0604020202020204" pitchFamily="34" charset="0"/>
+                <a:cs typeface="Arial" panose="020B0604020202020204" pitchFamily="34" charset="0"/>
+              </a:rPr>
+              <a:t>배포</a:t>
+            </a:r>
+            <a:r>
+              <a:rPr lang="en-US" altLang="ko-KR" sz="2000">
+                <a:solidFill>
+                  <a:schemeClr val="tx1"/>
+                </a:solidFill>
+                <a:latin typeface="Arial" panose="020B0604020202020204" pitchFamily="34" charset="0"/>
+                <a:cs typeface="Arial" panose="020B0604020202020204" pitchFamily="34" charset="0"/>
+              </a:rPr>
+              <a:t>/</a:t>
+            </a:r>
+            <a:r>
+              <a:rPr lang="ko-KR" altLang="en-US" sz="2000">
+                <a:solidFill>
+                  <a:schemeClr val="tx1"/>
+                </a:solidFill>
+                <a:latin typeface="Arial" panose="020B0604020202020204" pitchFamily="34" charset="0"/>
+                <a:cs typeface="Arial" panose="020B0604020202020204" pitchFamily="34" charset="0"/>
+              </a:rPr>
+              <a:t>판매</a:t>
+            </a:r>
+            <a:endParaRPr lang="ko-KR" altLang="en-US" sz="2000" dirty="0">
+              <a:solidFill>
+                <a:schemeClr val="tx1"/>
+              </a:solidFill>
+              <a:latin typeface="Arial" panose="020B0604020202020204" pitchFamily="34" charset="0"/>
+              <a:cs typeface="Arial" panose="020B0604020202020204" pitchFamily="34" charset="0"/>
+            </a:endParaRPr>
+          </a:p>
+        </p:txBody>
+      </p:sp>
+      <p:cxnSp>
+        <p:nvCxnSpPr>
+          <p:cNvPr id="8" name="직선 화살표 연결선 7">
+            <a:extLst>
+              <a:ext uri="{FF2B5EF4-FFF2-40B4-BE49-F238E27FC236}">
+                <a16:creationId xmlns:a16="http://schemas.microsoft.com/office/drawing/2014/main" id="{3DCD5011-E537-4943-8AE9-A8D80FE3D872}"/>
+              </a:ext>
+            </a:extLst>
+          </p:cNvPr>
+          <p:cNvCxnSpPr>
+            <a:cxnSpLocks/>
+            <a:stCxn id="4" idx="3"/>
+            <a:endCxn id="6" idx="2"/>
+          </p:cNvCxnSpPr>
+          <p:nvPr/>
+        </p:nvCxnSpPr>
+        <p:spPr>
+          <a:xfrm flipV="1">
+            <a:off x="4849320" y="3236815"/>
+            <a:ext cx="920603" cy="765865"/>
+          </a:xfrm>
+          <a:prstGeom prst="straightConnector1">
+            <a:avLst/>
+          </a:prstGeom>
+          <a:ln w="19050">
+            <a:solidFill>
+              <a:schemeClr val="tx1"/>
+            </a:solidFill>
+            <a:headEnd type="triangle" w="lg" len="lg"/>
+            <a:tailEnd type="none"/>
+          </a:ln>
+        </p:spPr>
+        <p:style>
+          <a:lnRef idx="1">
+            <a:schemeClr val="accent1"/>
+          </a:lnRef>
+          <a:fillRef idx="0">
+            <a:schemeClr val="accent1"/>
+          </a:fillRef>
+          <a:effectRef idx="0">
+            <a:schemeClr val="accent1"/>
+          </a:effectRef>
+          <a:fontRef idx="minor">
+            <a:schemeClr val="tx1"/>
+          </a:fontRef>
+        </p:style>
+      </p:cxnSp>
+      <p:cxnSp>
+        <p:nvCxnSpPr>
+          <p:cNvPr id="9" name="직선 화살표 연결선 8">
+            <a:extLst>
+              <a:ext uri="{FF2B5EF4-FFF2-40B4-BE49-F238E27FC236}">
+                <a16:creationId xmlns:a16="http://schemas.microsoft.com/office/drawing/2014/main" id="{CE66ADBD-302D-4B82-940F-C4D611AB9A3E}"/>
+              </a:ext>
+            </a:extLst>
+          </p:cNvPr>
+          <p:cNvCxnSpPr>
+            <a:cxnSpLocks/>
+            <a:stCxn id="5" idx="1"/>
+            <a:endCxn id="6" idx="3"/>
+          </p:cNvCxnSpPr>
+          <p:nvPr/>
+        </p:nvCxnSpPr>
+        <p:spPr>
+          <a:xfrm flipH="1">
+            <a:off x="6434591" y="2901535"/>
+            <a:ext cx="1669192" cy="0"/>
+          </a:xfrm>
+          <a:prstGeom prst="straightConnector1">
+            <a:avLst/>
+          </a:prstGeom>
+          <a:ln w="19050">
+            <a:solidFill>
+              <a:schemeClr val="tx1"/>
+            </a:solidFill>
+            <a:headEnd type="none" w="lg" len="lg"/>
+            <a:tailEnd type="triangle" w="lg" len="lg"/>
+          </a:ln>
+        </p:spPr>
+        <p:style>
+          <a:lnRef idx="1">
+            <a:schemeClr val="accent1"/>
+          </a:lnRef>
+          <a:fillRef idx="0">
+            <a:schemeClr val="accent1"/>
+          </a:fillRef>
+          <a:effectRef idx="0">
+            <a:schemeClr val="accent1"/>
+          </a:effectRef>
+          <a:fontRef idx="minor">
+            <a:schemeClr val="tx1"/>
+          </a:fontRef>
+        </p:style>
+      </p:cxnSp>
+      <p:sp>
+        <p:nvSpPr>
+          <p:cNvPr id="10" name="TextBox 9">
+            <a:extLst>
+              <a:ext uri="{FF2B5EF4-FFF2-40B4-BE49-F238E27FC236}">
+                <a16:creationId xmlns:a16="http://schemas.microsoft.com/office/drawing/2014/main" id="{8719ED7C-2E5D-405E-BE76-A35E1E4D3B87}"/>
+              </a:ext>
+            </a:extLst>
+          </p:cNvPr>
+          <p:cNvSpPr txBox="1"/>
+          <p:nvPr/>
+        </p:nvSpPr>
+        <p:spPr>
+          <a:xfrm>
+            <a:off x="6811468" y="2566255"/>
+            <a:ext cx="1682088" cy="377641"/>
+          </a:xfrm>
+          <a:prstGeom prst="rect">
+            <a:avLst/>
+          </a:prstGeom>
+          <a:noFill/>
+        </p:spPr>
+        <p:txBody>
+          <a:bodyPr wrap="square" rtlCol="0">
+            <a:spAutoFit/>
+          </a:bodyPr>
+          <a:lstStyle/>
+          <a:p>
+            <a:r>
+              <a:rPr lang="en-US" altLang="ko-KR">
+                <a:latin typeface="Arial" panose="020B0604020202020204" pitchFamily="34" charset="0"/>
+                <a:cs typeface="Arial" panose="020B0604020202020204" pitchFamily="34" charset="0"/>
+              </a:rPr>
+              <a:t>Generate</a:t>
+            </a:r>
+            <a:endParaRPr lang="ko-KR" altLang="en-US">
+              <a:latin typeface="Arial" panose="020B0604020202020204" pitchFamily="34" charset="0"/>
+              <a:cs typeface="Arial" panose="020B0604020202020204" pitchFamily="34" charset="0"/>
+            </a:endParaRPr>
+          </a:p>
+        </p:txBody>
+      </p:sp>
+      <p:sp>
+        <p:nvSpPr>
+          <p:cNvPr id="12" name="TextBox 11">
+            <a:extLst>
+              <a:ext uri="{FF2B5EF4-FFF2-40B4-BE49-F238E27FC236}">
+                <a16:creationId xmlns:a16="http://schemas.microsoft.com/office/drawing/2014/main" id="{4A8E83A3-AE12-4CBB-981E-E7D0DB152B2A}"/>
+              </a:ext>
+            </a:extLst>
+          </p:cNvPr>
+          <p:cNvSpPr txBox="1"/>
+          <p:nvPr/>
+        </p:nvSpPr>
+        <p:spPr>
+          <a:xfrm>
+            <a:off x="4539578" y="3387428"/>
+            <a:ext cx="766484" cy="369332"/>
+          </a:xfrm>
+          <a:prstGeom prst="rect">
+            <a:avLst/>
+          </a:prstGeom>
+          <a:noFill/>
+        </p:spPr>
+        <p:txBody>
+          <a:bodyPr wrap="square" rtlCol="0">
+            <a:spAutoFit/>
+          </a:bodyPr>
+          <a:lstStyle/>
+          <a:p>
+            <a:r>
+              <a:rPr lang="en-US" altLang="ko-KR">
+                <a:latin typeface="Arial" panose="020B0604020202020204" pitchFamily="34" charset="0"/>
+                <a:cs typeface="Arial" panose="020B0604020202020204" pitchFamily="34" charset="0"/>
+              </a:rPr>
+              <a:t>Send</a:t>
+            </a:r>
+            <a:endParaRPr lang="ko-KR" altLang="en-US">
+              <a:latin typeface="Arial" panose="020B0604020202020204" pitchFamily="34" charset="0"/>
+              <a:cs typeface="Arial" panose="020B0604020202020204" pitchFamily="34" charset="0"/>
+            </a:endParaRPr>
+          </a:p>
+        </p:txBody>
+      </p:sp>
+      <p:sp>
+        <p:nvSpPr>
+          <p:cNvPr id="15" name="화살표: 오각형 14">
+            <a:extLst>
+              <a:ext uri="{FF2B5EF4-FFF2-40B4-BE49-F238E27FC236}">
+                <a16:creationId xmlns:a16="http://schemas.microsoft.com/office/drawing/2014/main" id="{93794B9C-FE39-4AA9-B0DE-671C18626363}"/>
+              </a:ext>
+            </a:extLst>
+          </p:cNvPr>
+          <p:cNvSpPr/>
+          <p:nvPr/>
+        </p:nvSpPr>
+        <p:spPr>
+          <a:xfrm rot="16200000">
+            <a:off x="6343836" y="3773231"/>
+            <a:ext cx="806172" cy="1265067"/>
+          </a:xfrm>
+          <a:prstGeom prst="homePlate">
+            <a:avLst>
+              <a:gd name="adj" fmla="val 39700"/>
+            </a:avLst>
+          </a:prstGeom>
+          <a:solidFill>
+            <a:srgbClr val="E5E57F"/>
+          </a:solidFill>
+          <a:ln w="19050">
+            <a:solidFill>
+              <a:schemeClr val="tx1"/>
+            </a:solidFill>
+          </a:ln>
+        </p:spPr>
+        <p:style>
+          <a:lnRef idx="2">
+            <a:schemeClr val="accent1">
+              <a:shade val="50000"/>
+            </a:schemeClr>
+          </a:lnRef>
+          <a:fillRef idx="1">
+            <a:schemeClr val="accent1"/>
+          </a:fillRef>
+          <a:effectRef idx="0">
+            <a:schemeClr val="accent1"/>
+          </a:effectRef>
+          <a:fontRef idx="minor">
+            <a:schemeClr val="lt1"/>
+          </a:fontRef>
+        </p:style>
+        <p:txBody>
+          <a:bodyPr vert="eaVert" rtlCol="0" anchor="ctr"/>
+          <a:lstStyle/>
+          <a:p>
+            <a:pPr algn="ctr"/>
+            <a:r>
+              <a:rPr lang="en-US" altLang="ko-KR" sz="2000">
+                <a:solidFill>
+                  <a:schemeClr val="tx1"/>
+                </a:solidFill>
+                <a:latin typeface="Arial" panose="020B0604020202020204" pitchFamily="34" charset="0"/>
+                <a:cs typeface="Arial" panose="020B0604020202020204" pitchFamily="34" charset="0"/>
+              </a:rPr>
+              <a:t>Person2</a:t>
+            </a:r>
+            <a:endParaRPr lang="ko-KR" altLang="en-US" sz="2000">
+              <a:solidFill>
+                <a:schemeClr val="tx1"/>
+              </a:solidFill>
+              <a:latin typeface="Arial" panose="020B0604020202020204" pitchFamily="34" charset="0"/>
+              <a:cs typeface="Arial" panose="020B0604020202020204" pitchFamily="34" charset="0"/>
+            </a:endParaRPr>
+          </a:p>
+        </p:txBody>
+      </p:sp>
+      <p:cxnSp>
+        <p:nvCxnSpPr>
+          <p:cNvPr id="16" name="직선 화살표 연결선 15">
+            <a:extLst>
+              <a:ext uri="{FF2B5EF4-FFF2-40B4-BE49-F238E27FC236}">
+                <a16:creationId xmlns:a16="http://schemas.microsoft.com/office/drawing/2014/main" id="{985550B4-3B5E-4AF1-AA6A-07A1E30477F8}"/>
+              </a:ext>
+            </a:extLst>
+          </p:cNvPr>
+          <p:cNvCxnSpPr>
+            <a:cxnSpLocks/>
+            <a:stCxn id="15" idx="3"/>
+            <a:endCxn id="6" idx="2"/>
+          </p:cNvCxnSpPr>
+          <p:nvPr/>
+        </p:nvCxnSpPr>
+        <p:spPr>
+          <a:xfrm flipH="1" flipV="1">
+            <a:off x="5769923" y="3236815"/>
+            <a:ext cx="977000" cy="765864"/>
+          </a:xfrm>
+          <a:prstGeom prst="straightConnector1">
+            <a:avLst/>
+          </a:prstGeom>
+          <a:ln w="19050">
+            <a:solidFill>
+              <a:schemeClr val="tx1"/>
+            </a:solidFill>
+            <a:headEnd type="triangle" w="lg" len="lg"/>
+            <a:tailEnd type="none"/>
+          </a:ln>
+        </p:spPr>
+        <p:style>
+          <a:lnRef idx="1">
+            <a:schemeClr val="accent1"/>
+          </a:lnRef>
+          <a:fillRef idx="0">
+            <a:schemeClr val="accent1"/>
+          </a:fillRef>
+          <a:effectRef idx="0">
+            <a:schemeClr val="accent1"/>
+          </a:effectRef>
+          <a:fontRef idx="minor">
+            <a:schemeClr val="tx1"/>
+          </a:fontRef>
+        </p:style>
+      </p:cxnSp>
+      <p:sp>
+        <p:nvSpPr>
+          <p:cNvPr id="17" name="TextBox 16">
+            <a:extLst>
+              <a:ext uri="{FF2B5EF4-FFF2-40B4-BE49-F238E27FC236}">
+                <a16:creationId xmlns:a16="http://schemas.microsoft.com/office/drawing/2014/main" id="{B2548EAD-E824-4753-97C1-3DAC752884BC}"/>
+              </a:ext>
+            </a:extLst>
+          </p:cNvPr>
+          <p:cNvSpPr txBox="1"/>
+          <p:nvPr/>
+        </p:nvSpPr>
+        <p:spPr>
+          <a:xfrm>
+            <a:off x="6288591" y="3387428"/>
+            <a:ext cx="2757869" cy="369332"/>
+          </a:xfrm>
+          <a:prstGeom prst="rect">
+            <a:avLst/>
+          </a:prstGeom>
+          <a:noFill/>
+        </p:spPr>
+        <p:txBody>
+          <a:bodyPr wrap="square" rtlCol="0">
+            <a:spAutoFit/>
+          </a:bodyPr>
+          <a:lstStyle/>
+          <a:p>
+            <a:r>
+              <a:rPr lang="en-US" altLang="ko-KR">
+                <a:latin typeface="Arial" panose="020B0604020202020204" pitchFamily="34" charset="0"/>
+                <a:cs typeface="Arial" panose="020B0604020202020204" pitchFamily="34" charset="0"/>
+              </a:rPr>
+              <a:t>Receive</a:t>
+            </a:r>
+            <a:endParaRPr lang="ko-KR" altLang="en-US">
+              <a:latin typeface="Arial" panose="020B0604020202020204" pitchFamily="34" charset="0"/>
+              <a:cs typeface="Arial" panose="020B0604020202020204" pitchFamily="34" charset="0"/>
+            </a:endParaRPr>
+          </a:p>
+        </p:txBody>
+      </p:sp>
+    </p:spTree>
+    <p:extLst>
+      <p:ext uri="{BB962C8B-B14F-4D97-AF65-F5344CB8AC3E}">
+        <p14:creationId xmlns:p14="http://schemas.microsoft.com/office/powerpoint/2010/main" val="2161994729"/>
+      </p:ext>
+    </p:extLst>
+  </p:cSld>
+  <p:clrMapOvr>
+    <a:masterClrMapping/>
+  </p:clrMapOvr>
+</p:sld>
+</file>
+
 <file path=ppt/slides/slide2.xml><?xml version="1.0" encoding="utf-8"?>
 <p:sld xmlns:a="http://schemas.openxmlformats.org/drawingml/2006/main" xmlns:r="http://schemas.openxmlformats.org/officeDocument/2006/relationships" xmlns:p="http://schemas.openxmlformats.org/presentationml/2006/main">
   <p:cSld>
@@ -25546,6 +28472,40 @@
           </a:p>
         </p:txBody>
       </p:sp>
+      <p:sp>
+        <p:nvSpPr>
+          <p:cNvPr id="17" name="제목 1">
+            <a:extLst>
+              <a:ext uri="{FF2B5EF4-FFF2-40B4-BE49-F238E27FC236}">
+                <a16:creationId xmlns:a16="http://schemas.microsoft.com/office/drawing/2014/main" id="{51DCDD7D-F028-4062-8BD1-792B89D86504}"/>
+              </a:ext>
+            </a:extLst>
+          </p:cNvPr>
+          <p:cNvSpPr>
+            <a:spLocks noGrp="1"/>
+          </p:cNvSpPr>
+          <p:nvPr>
+            <p:ph type="title"/>
+          </p:nvPr>
+        </p:nvSpPr>
+        <p:spPr>
+          <a:xfrm>
+            <a:off x="838200" y="365125"/>
+            <a:ext cx="10515600" cy="1325563"/>
+          </a:xfrm>
+        </p:spPr>
+        <p:txBody>
+          <a:bodyPr/>
+          <a:lstStyle/>
+          <a:p>
+            <a:r>
+              <a:rPr lang="en-US" altLang="ko-KR"/>
+              <a:t>Version 1.0</a:t>
+            </a:r>
+            <a:endParaRPr lang="ko-KR" altLang="en-US"/>
+          </a:p>
+        </p:txBody>
+      </p:sp>
     </p:spTree>
     <p:extLst>
       <p:ext uri="{BB962C8B-B14F-4D97-AF65-F5344CB8AC3E}">

</xml_diff>